<commit_message>
Update Chapter 1 notes/presentation
</commit_message>
<xml_diff>
--- a/fpp_cohort_2.pptx
+++ b/fpp_cohort_2.pptx
@@ -3080,7 +3080,7 @@
           <a:noFill/>
           <a:extLst>
             <a:ext uri="{909E8E84-426E-40dd-AFC4-6F175D3DCCD1}">
-              <a14:hiddenFill xmlns="" xmlns:a14="http://schemas.microsoft.com/office/drawing/2010/main">
+              <a14:hiddenFill xmlns:a14="http://schemas.microsoft.com/office/drawing/2010/main" xmlns="">
                 <a:solidFill>
                   <a:srgbClr val="FFFFFF"/>
                 </a:solidFill>
@@ -3140,7 +3140,7 @@
             </a:ln>
             <a:extLst>
               <a:ext uri="{91240B29-F687-4f45-9708-019B960494DF}">
-                <a14:hiddenLine xmlns="" xmlns:a14="http://schemas.microsoft.com/office/drawing/2010/main" w="9525">
+                <a14:hiddenLine xmlns:a14="http://schemas.microsoft.com/office/drawing/2010/main" xmlns="" w="9525">
                   <a:solidFill>
                     <a:srgbClr val="000000"/>
                   </a:solidFill>
@@ -3230,7 +3230,7 @@
             </a:ln>
             <a:extLst>
               <a:ext uri="{91240B29-F687-4f45-9708-019B960494DF}">
-                <a14:hiddenLine xmlns="" xmlns:a14="http://schemas.microsoft.com/office/drawing/2010/main" w="9525">
+                <a14:hiddenLine xmlns:a14="http://schemas.microsoft.com/office/drawing/2010/main" xmlns="" w="9525">
                   <a:solidFill>
                     <a:srgbClr val="000000"/>
                   </a:solidFill>
@@ -3320,7 +3320,7 @@
             </a:ln>
             <a:extLst>
               <a:ext uri="{91240B29-F687-4f45-9708-019B960494DF}">
-                <a14:hiddenLine xmlns="" xmlns:a14="http://schemas.microsoft.com/office/drawing/2010/main" w="9525">
+                <a14:hiddenLine xmlns:a14="http://schemas.microsoft.com/office/drawing/2010/main" xmlns="" w="9525">
                   <a:solidFill>
                     <a:srgbClr val="000000"/>
                   </a:solidFill>
@@ -3354,7 +3354,7 @@
             </a:ln>
             <a:extLst>
               <a:ext uri="{91240B29-F687-4f45-9708-019B960494DF}">
-                <a14:hiddenLine xmlns="" xmlns:a14="http://schemas.microsoft.com/office/drawing/2010/main" w="9525">
+                <a14:hiddenLine xmlns:a14="http://schemas.microsoft.com/office/drawing/2010/main" xmlns="" w="9525">
                   <a:solidFill>
                     <a:srgbClr val="000000"/>
                   </a:solidFill>
@@ -3444,7 +3444,7 @@
             </a:ln>
             <a:extLst>
               <a:ext uri="{91240B29-F687-4f45-9708-019B960494DF}">
-                <a14:hiddenLine xmlns="" xmlns:a14="http://schemas.microsoft.com/office/drawing/2010/main" w="9525">
+                <a14:hiddenLine xmlns:a14="http://schemas.microsoft.com/office/drawing/2010/main" xmlns="" w="9525">
                   <a:solidFill>
                     <a:srgbClr val="000000"/>
                   </a:solidFill>
@@ -3506,7 +3506,7 @@
             </a:ln>
             <a:extLst>
               <a:ext uri="{91240B29-F687-4f45-9708-019B960494DF}">
-                <a14:hiddenLine xmlns="" xmlns:a14="http://schemas.microsoft.com/office/drawing/2010/main" w="9525">
+                <a14:hiddenLine xmlns:a14="http://schemas.microsoft.com/office/drawing/2010/main" xmlns="" w="9525">
                   <a:solidFill>
                     <a:srgbClr val="000000"/>
                   </a:solidFill>
@@ -3568,7 +3568,7 @@
             </a:ln>
             <a:extLst>
               <a:ext uri="{91240B29-F687-4f45-9708-019B960494DF}">
-                <a14:hiddenLine xmlns="" xmlns:a14="http://schemas.microsoft.com/office/drawing/2010/main" w="9525">
+                <a14:hiddenLine xmlns:a14="http://schemas.microsoft.com/office/drawing/2010/main" xmlns="" w="9525">
                   <a:solidFill>
                     <a:srgbClr val="000000"/>
                   </a:solidFill>
@@ -3658,7 +3658,7 @@
             </a:ln>
             <a:extLst>
               <a:ext uri="{91240B29-F687-4f45-9708-019B960494DF}">
-                <a14:hiddenLine xmlns="" xmlns:a14="http://schemas.microsoft.com/office/drawing/2010/main" w="9525">
+                <a14:hiddenLine xmlns:a14="http://schemas.microsoft.com/office/drawing/2010/main" xmlns="" w="9525">
                   <a:solidFill>
                     <a:srgbClr val="000000"/>
                   </a:solidFill>
@@ -3720,7 +3720,7 @@
             </a:ln>
             <a:extLst>
               <a:ext uri="{91240B29-F687-4f45-9708-019B960494DF}">
-                <a14:hiddenLine xmlns="" xmlns:a14="http://schemas.microsoft.com/office/drawing/2010/main" w="9525">
+                <a14:hiddenLine xmlns:a14="http://schemas.microsoft.com/office/drawing/2010/main" xmlns="" w="9525">
                   <a:solidFill>
                     <a:srgbClr val="000000"/>
                   </a:solidFill>
@@ -3782,7 +3782,7 @@
             </a:ln>
             <a:extLst>
               <a:ext uri="{91240B29-F687-4f45-9708-019B960494DF}">
-                <a14:hiddenLine xmlns="" xmlns:a14="http://schemas.microsoft.com/office/drawing/2010/main" w="9525">
+                <a14:hiddenLine xmlns:a14="http://schemas.microsoft.com/office/drawing/2010/main" xmlns="" w="9525">
                   <a:solidFill>
                     <a:srgbClr val="000000"/>
                   </a:solidFill>
@@ -3872,7 +3872,7 @@
             </a:ln>
             <a:extLst>
               <a:ext uri="{91240B29-F687-4f45-9708-019B960494DF}">
-                <a14:hiddenLine xmlns="" xmlns:a14="http://schemas.microsoft.com/office/drawing/2010/main" w="9525">
+                <a14:hiddenLine xmlns:a14="http://schemas.microsoft.com/office/drawing/2010/main" xmlns="" w="9525">
                   <a:solidFill>
                     <a:srgbClr val="000000"/>
                   </a:solidFill>
@@ -3962,7 +3962,7 @@
             </a:ln>
             <a:extLst>
               <a:ext uri="{91240B29-F687-4f45-9708-019B960494DF}">
-                <a14:hiddenLine xmlns="" xmlns:a14="http://schemas.microsoft.com/office/drawing/2010/main" w="9525">
+                <a14:hiddenLine xmlns:a14="http://schemas.microsoft.com/office/drawing/2010/main" xmlns="" w="9525">
                   <a:solidFill>
                     <a:srgbClr val="000000"/>
                   </a:solidFill>
@@ -4024,7 +4024,7 @@
             </a:ln>
             <a:extLst>
               <a:ext uri="{91240B29-F687-4f45-9708-019B960494DF}">
-                <a14:hiddenLine xmlns="" xmlns:a14="http://schemas.microsoft.com/office/drawing/2010/main" w="9525">
+                <a14:hiddenLine xmlns:a14="http://schemas.microsoft.com/office/drawing/2010/main" xmlns="" w="9525">
                   <a:solidFill>
                     <a:srgbClr val="000000"/>
                   </a:solidFill>
@@ -4134,7 +4134,7 @@
             </a:ln>
             <a:extLst>
               <a:ext uri="{91240B29-F687-4f45-9708-019B960494DF}">
-                <a14:hiddenLine xmlns="" xmlns:a14="http://schemas.microsoft.com/office/drawing/2010/main" w="9525">
+                <a14:hiddenLine xmlns:a14="http://schemas.microsoft.com/office/drawing/2010/main" xmlns="" w="9525">
                   <a:solidFill>
                     <a:srgbClr val="000000"/>
                   </a:solidFill>
@@ -4196,7 +4196,7 @@
             </a:ln>
             <a:extLst>
               <a:ext uri="{91240B29-F687-4f45-9708-019B960494DF}">
-                <a14:hiddenLine xmlns="" xmlns:a14="http://schemas.microsoft.com/office/drawing/2010/main" w="9525">
+                <a14:hiddenLine xmlns:a14="http://schemas.microsoft.com/office/drawing/2010/main" xmlns="" w="9525">
                   <a:solidFill>
                     <a:srgbClr val="000000"/>
                   </a:solidFill>
@@ -4286,7 +4286,7 @@
             </a:ln>
             <a:extLst>
               <a:ext uri="{91240B29-F687-4f45-9708-019B960494DF}">
-                <a14:hiddenLine xmlns="" xmlns:a14="http://schemas.microsoft.com/office/drawing/2010/main" w="9525">
+                <a14:hiddenLine xmlns:a14="http://schemas.microsoft.com/office/drawing/2010/main" xmlns="" w="9525">
                   <a:solidFill>
                     <a:srgbClr val="000000"/>
                   </a:solidFill>
@@ -4376,7 +4376,7 @@
             </a:ln>
             <a:extLst>
               <a:ext uri="{91240B29-F687-4f45-9708-019B960494DF}">
-                <a14:hiddenLine xmlns="" xmlns:a14="http://schemas.microsoft.com/office/drawing/2010/main" w="9525">
+                <a14:hiddenLine xmlns:a14="http://schemas.microsoft.com/office/drawing/2010/main" xmlns="" w="9525">
                   <a:solidFill>
                     <a:srgbClr val="000000"/>
                   </a:solidFill>
@@ -4438,7 +4438,7 @@
             </a:ln>
             <a:extLst>
               <a:ext uri="{91240B29-F687-4f45-9708-019B960494DF}">
-                <a14:hiddenLine xmlns="" xmlns:a14="http://schemas.microsoft.com/office/drawing/2010/main" w="9525">
+                <a14:hiddenLine xmlns:a14="http://schemas.microsoft.com/office/drawing/2010/main" xmlns="" w="9525">
                   <a:solidFill>
                     <a:srgbClr val="000000"/>
                   </a:solidFill>
@@ -4528,7 +4528,7 @@
             </a:ln>
             <a:extLst>
               <a:ext uri="{91240B29-F687-4f45-9708-019B960494DF}">
-                <a14:hiddenLine xmlns="" xmlns:a14="http://schemas.microsoft.com/office/drawing/2010/main" w="9525">
+                <a14:hiddenLine xmlns:a14="http://schemas.microsoft.com/office/drawing/2010/main" xmlns="" w="9525">
                   <a:solidFill>
                     <a:srgbClr val="000000"/>
                   </a:solidFill>
@@ -4618,7 +4618,7 @@
             </a:ln>
             <a:extLst>
               <a:ext uri="{91240B29-F687-4f45-9708-019B960494DF}">
-                <a14:hiddenLine xmlns="" xmlns:a14="http://schemas.microsoft.com/office/drawing/2010/main" w="9525">
+                <a14:hiddenLine xmlns:a14="http://schemas.microsoft.com/office/drawing/2010/main" xmlns="" w="9525">
                   <a:solidFill>
                     <a:srgbClr val="000000"/>
                   </a:solidFill>
@@ -4674,7 +4674,7 @@
             </a:ln>
             <a:extLst>
               <a:ext uri="{91240B29-F687-4f45-9708-019B960494DF}">
-                <a14:hiddenLine xmlns="" xmlns:a14="http://schemas.microsoft.com/office/drawing/2010/main" w="9525">
+                <a14:hiddenLine xmlns:a14="http://schemas.microsoft.com/office/drawing/2010/main" xmlns="" w="9525">
                   <a:solidFill>
                     <a:srgbClr val="000000"/>
                   </a:solidFill>
@@ -4764,7 +4764,7 @@
             </a:ln>
             <a:extLst>
               <a:ext uri="{91240B29-F687-4f45-9708-019B960494DF}">
-                <a14:hiddenLine xmlns="" xmlns:a14="http://schemas.microsoft.com/office/drawing/2010/main" w="9525">
+                <a14:hiddenLine xmlns:a14="http://schemas.microsoft.com/office/drawing/2010/main" xmlns="" w="9525">
                   <a:solidFill>
                     <a:srgbClr val="000000"/>
                   </a:solidFill>
@@ -4820,7 +4820,7 @@
             </a:ln>
             <a:extLst>
               <a:ext uri="{91240B29-F687-4f45-9708-019B960494DF}">
-                <a14:hiddenLine xmlns="" xmlns:a14="http://schemas.microsoft.com/office/drawing/2010/main" w="9525">
+                <a14:hiddenLine xmlns:a14="http://schemas.microsoft.com/office/drawing/2010/main" xmlns="" w="9525">
                   <a:solidFill>
                     <a:srgbClr val="000000"/>
                   </a:solidFill>
@@ -4910,7 +4910,7 @@
             </a:ln>
             <a:extLst>
               <a:ext uri="{91240B29-F687-4f45-9708-019B960494DF}">
-                <a14:hiddenLine xmlns="" xmlns:a14="http://schemas.microsoft.com/office/drawing/2010/main" w="9525">
+                <a14:hiddenLine xmlns:a14="http://schemas.microsoft.com/office/drawing/2010/main" xmlns="" w="9525">
                   <a:solidFill>
                     <a:srgbClr val="000000"/>
                   </a:solidFill>
@@ -4978,7 +4978,7 @@
             </a:ln>
             <a:extLst>
               <a:ext uri="{91240B29-F687-4f45-9708-019B960494DF}">
-                <a14:hiddenLine xmlns="" xmlns:a14="http://schemas.microsoft.com/office/drawing/2010/main" w="9525">
+                <a14:hiddenLine xmlns:a14="http://schemas.microsoft.com/office/drawing/2010/main" xmlns="" w="9525">
                   <a:solidFill>
                     <a:srgbClr val="000000"/>
                   </a:solidFill>
@@ -5068,7 +5068,7 @@
             </a:ln>
             <a:extLst>
               <a:ext uri="{91240B29-F687-4f45-9708-019B960494DF}">
-                <a14:hiddenLine xmlns="" xmlns:a14="http://schemas.microsoft.com/office/drawing/2010/main" w="9525">
+                <a14:hiddenLine xmlns:a14="http://schemas.microsoft.com/office/drawing/2010/main" xmlns="" w="9525">
                   <a:solidFill>
                     <a:srgbClr val="000000"/>
                   </a:solidFill>
@@ -5136,7 +5136,7 @@
             </a:ln>
             <a:extLst>
               <a:ext uri="{91240B29-F687-4f45-9708-019B960494DF}">
-                <a14:hiddenLine xmlns="" xmlns:a14="http://schemas.microsoft.com/office/drawing/2010/main" w="9525">
+                <a14:hiddenLine xmlns:a14="http://schemas.microsoft.com/office/drawing/2010/main" xmlns="" w="9525">
                   <a:solidFill>
                     <a:srgbClr val="000000"/>
                   </a:solidFill>
@@ -5226,7 +5226,7 @@
             </a:ln>
             <a:extLst>
               <a:ext uri="{91240B29-F687-4f45-9708-019B960494DF}">
-                <a14:hiddenLine xmlns="" xmlns:a14="http://schemas.microsoft.com/office/drawing/2010/main" w="9525">
+                <a14:hiddenLine xmlns:a14="http://schemas.microsoft.com/office/drawing/2010/main" xmlns="" w="9525">
                   <a:solidFill>
                     <a:srgbClr val="000000"/>
                   </a:solidFill>
@@ -5260,7 +5260,7 @@
             </a:ln>
             <a:extLst>
               <a:ext uri="{91240B29-F687-4f45-9708-019B960494DF}">
-                <a14:hiddenLine xmlns="" xmlns:a14="http://schemas.microsoft.com/office/drawing/2010/main" w="9525">
+                <a14:hiddenLine xmlns:a14="http://schemas.microsoft.com/office/drawing/2010/main" xmlns="" w="9525">
                   <a:solidFill>
                     <a:srgbClr val="000000"/>
                   </a:solidFill>
@@ -5350,7 +5350,7 @@
             </a:ln>
             <a:extLst>
               <a:ext uri="{91240B29-F687-4f45-9708-019B960494DF}">
-                <a14:hiddenLine xmlns="" xmlns:a14="http://schemas.microsoft.com/office/drawing/2010/main" w="9525">
+                <a14:hiddenLine xmlns:a14="http://schemas.microsoft.com/office/drawing/2010/main" xmlns="" w="9525">
                   <a:solidFill>
                     <a:srgbClr val="000000"/>
                   </a:solidFill>
@@ -5412,7 +5412,7 @@
             </a:ln>
             <a:extLst>
               <a:ext uri="{91240B29-F687-4f45-9708-019B960494DF}">
-                <a14:hiddenLine xmlns="" xmlns:a14="http://schemas.microsoft.com/office/drawing/2010/main" w="9525">
+                <a14:hiddenLine xmlns:a14="http://schemas.microsoft.com/office/drawing/2010/main" xmlns="" w="9525">
                   <a:solidFill>
                     <a:srgbClr val="000000"/>
                   </a:solidFill>
@@ -5474,7 +5474,7 @@
             </a:ln>
             <a:extLst>
               <a:ext uri="{91240B29-F687-4f45-9708-019B960494DF}">
-                <a14:hiddenLine xmlns="" xmlns:a14="http://schemas.microsoft.com/office/drawing/2010/main" w="9525">
+                <a14:hiddenLine xmlns:a14="http://schemas.microsoft.com/office/drawing/2010/main" xmlns="" w="9525">
                   <a:solidFill>
                     <a:srgbClr val="000000"/>
                   </a:solidFill>
@@ -5564,7 +5564,7 @@
             </a:ln>
             <a:extLst>
               <a:ext uri="{91240B29-F687-4f45-9708-019B960494DF}">
-                <a14:hiddenLine xmlns="" xmlns:a14="http://schemas.microsoft.com/office/drawing/2010/main" w="9525">
+                <a14:hiddenLine xmlns:a14="http://schemas.microsoft.com/office/drawing/2010/main" xmlns="" w="9525">
                   <a:solidFill>
                     <a:srgbClr val="000000"/>
                   </a:solidFill>
@@ -5632,7 +5632,7 @@
             </a:ln>
             <a:extLst>
               <a:ext uri="{91240B29-F687-4f45-9708-019B960494DF}">
-                <a14:hiddenLine xmlns="" xmlns:a14="http://schemas.microsoft.com/office/drawing/2010/main" w="9525">
+                <a14:hiddenLine xmlns:a14="http://schemas.microsoft.com/office/drawing/2010/main" xmlns="" w="9525">
                   <a:solidFill>
                     <a:srgbClr val="000000"/>
                   </a:solidFill>
@@ -5694,7 +5694,7 @@
             </a:ln>
             <a:extLst>
               <a:ext uri="{91240B29-F687-4f45-9708-019B960494DF}">
-                <a14:hiddenLine xmlns="" xmlns:a14="http://schemas.microsoft.com/office/drawing/2010/main" w="9525">
+                <a14:hiddenLine xmlns:a14="http://schemas.microsoft.com/office/drawing/2010/main" xmlns="" w="9525">
                   <a:solidFill>
                     <a:srgbClr val="000000"/>
                   </a:solidFill>
@@ -5784,7 +5784,7 @@
             </a:ln>
             <a:extLst>
               <a:ext uri="{91240B29-F687-4f45-9708-019B960494DF}">
-                <a14:hiddenLine xmlns="" xmlns:a14="http://schemas.microsoft.com/office/drawing/2010/main" w="9525">
+                <a14:hiddenLine xmlns:a14="http://schemas.microsoft.com/office/drawing/2010/main" xmlns="" w="9525">
                   <a:solidFill>
                     <a:srgbClr val="000000"/>
                   </a:solidFill>
@@ -5846,7 +5846,7 @@
             </a:ln>
             <a:extLst>
               <a:ext uri="{91240B29-F687-4f45-9708-019B960494DF}">
-                <a14:hiddenLine xmlns="" xmlns:a14="http://schemas.microsoft.com/office/drawing/2010/main" w="9525">
+                <a14:hiddenLine xmlns:a14="http://schemas.microsoft.com/office/drawing/2010/main" xmlns="" w="9525">
                   <a:solidFill>
                     <a:srgbClr val="000000"/>
                   </a:solidFill>
@@ -5936,7 +5936,7 @@
             </a:ln>
             <a:extLst>
               <a:ext uri="{91240B29-F687-4f45-9708-019B960494DF}">
-                <a14:hiddenLine xmlns="" xmlns:a14="http://schemas.microsoft.com/office/drawing/2010/main" w="9525">
+                <a14:hiddenLine xmlns:a14="http://schemas.microsoft.com/office/drawing/2010/main" xmlns="" w="9525">
                   <a:solidFill>
                     <a:srgbClr val="000000"/>
                   </a:solidFill>
@@ -5998,7 +5998,7 @@
             </a:ln>
             <a:extLst>
               <a:ext uri="{91240B29-F687-4f45-9708-019B960494DF}">
-                <a14:hiddenLine xmlns="" xmlns:a14="http://schemas.microsoft.com/office/drawing/2010/main" w="9525">
+                <a14:hiddenLine xmlns:a14="http://schemas.microsoft.com/office/drawing/2010/main" xmlns="" w="9525">
                   <a:solidFill>
                     <a:srgbClr val="000000"/>
                   </a:solidFill>
@@ -6088,7 +6088,7 @@
             </a:ln>
             <a:extLst>
               <a:ext uri="{91240B29-F687-4f45-9708-019B960494DF}">
-                <a14:hiddenLine xmlns="" xmlns:a14="http://schemas.microsoft.com/office/drawing/2010/main" w="9525">
+                <a14:hiddenLine xmlns:a14="http://schemas.microsoft.com/office/drawing/2010/main" xmlns="" w="9525">
                   <a:solidFill>
                     <a:srgbClr val="000000"/>
                   </a:solidFill>
@@ -6122,7 +6122,7 @@
             </a:ln>
             <a:extLst>
               <a:ext uri="{91240B29-F687-4f45-9708-019B960494DF}">
-                <a14:hiddenLine xmlns="" xmlns:a14="http://schemas.microsoft.com/office/drawing/2010/main" w="9525">
+                <a14:hiddenLine xmlns:a14="http://schemas.microsoft.com/office/drawing/2010/main" xmlns="" w="9525">
                   <a:solidFill>
                     <a:srgbClr val="000000"/>
                   </a:solidFill>
@@ -6187,7 +6187,7 @@
             </a:ln>
             <a:extLst>
               <a:ext uri="{91240B29-F687-4f45-9708-019B960494DF}">
-                <a14:hiddenLine xmlns="" xmlns:a14="http://schemas.microsoft.com/office/drawing/2010/main" w="9525">
+                <a14:hiddenLine xmlns:a14="http://schemas.microsoft.com/office/drawing/2010/main" xmlns="" w="9525">
                   <a:solidFill>
                     <a:srgbClr val="000000"/>
                   </a:solidFill>
@@ -6277,7 +6277,7 @@
             </a:ln>
             <a:extLst>
               <a:ext uri="{91240B29-F687-4f45-9708-019B960494DF}">
-                <a14:hiddenLine xmlns="" xmlns:a14="http://schemas.microsoft.com/office/drawing/2010/main" w="9525">
+                <a14:hiddenLine xmlns:a14="http://schemas.microsoft.com/office/drawing/2010/main" xmlns="" w="9525">
                   <a:solidFill>
                     <a:srgbClr val="000000"/>
                   </a:solidFill>
@@ -6339,7 +6339,7 @@
             </a:ln>
             <a:extLst>
               <a:ext uri="{91240B29-F687-4f45-9708-019B960494DF}">
-                <a14:hiddenLine xmlns="" xmlns:a14="http://schemas.microsoft.com/office/drawing/2010/main" w="9525">
+                <a14:hiddenLine xmlns:a14="http://schemas.microsoft.com/office/drawing/2010/main" xmlns="" w="9525">
                   <a:solidFill>
                     <a:srgbClr val="000000"/>
                   </a:solidFill>
@@ -6429,7 +6429,7 @@
             </a:ln>
             <a:extLst>
               <a:ext uri="{91240B29-F687-4f45-9708-019B960494DF}">
-                <a14:hiddenLine xmlns="" xmlns:a14="http://schemas.microsoft.com/office/drawing/2010/main" w="9525">
+                <a14:hiddenLine xmlns:a14="http://schemas.microsoft.com/office/drawing/2010/main" xmlns="" w="9525">
                   <a:solidFill>
                     <a:srgbClr val="000000"/>
                   </a:solidFill>
@@ -6519,7 +6519,7 @@
             </a:ln>
             <a:extLst>
               <a:ext uri="{91240B29-F687-4f45-9708-019B960494DF}">
-                <a14:hiddenLine xmlns="" xmlns:a14="http://schemas.microsoft.com/office/drawing/2010/main" w="9525">
+                <a14:hiddenLine xmlns:a14="http://schemas.microsoft.com/office/drawing/2010/main" xmlns="" w="9525">
                   <a:solidFill>
                     <a:srgbClr val="000000"/>
                   </a:solidFill>
@@ -6584,7 +6584,7 @@
             </a:ln>
             <a:extLst>
               <a:ext uri="{91240B29-F687-4f45-9708-019B960494DF}">
-                <a14:hiddenLine xmlns="" xmlns:a14="http://schemas.microsoft.com/office/drawing/2010/main" w="9525">
+                <a14:hiddenLine xmlns:a14="http://schemas.microsoft.com/office/drawing/2010/main" xmlns="" w="9525">
                   <a:solidFill>
                     <a:srgbClr val="000000"/>
                   </a:solidFill>
@@ -6646,7 +6646,7 @@
             </a:ln>
             <a:extLst>
               <a:ext uri="{91240B29-F687-4f45-9708-019B960494DF}">
-                <a14:hiddenLine xmlns="" xmlns:a14="http://schemas.microsoft.com/office/drawing/2010/main" w="9525">
+                <a14:hiddenLine xmlns:a14="http://schemas.microsoft.com/office/drawing/2010/main" xmlns="" w="9525">
                   <a:solidFill>
                     <a:srgbClr val="000000"/>
                   </a:solidFill>
@@ -6736,7 +6736,7 @@
             </a:ln>
             <a:extLst>
               <a:ext uri="{91240B29-F687-4f45-9708-019B960494DF}">
-                <a14:hiddenLine xmlns="" xmlns:a14="http://schemas.microsoft.com/office/drawing/2010/main" w="9525">
+                <a14:hiddenLine xmlns:a14="http://schemas.microsoft.com/office/drawing/2010/main" xmlns="" w="9525">
                   <a:solidFill>
                     <a:srgbClr val="000000"/>
                   </a:solidFill>
@@ -6826,7 +6826,7 @@
             </a:ln>
             <a:extLst>
               <a:ext uri="{91240B29-F687-4f45-9708-019B960494DF}">
-                <a14:hiddenLine xmlns="" xmlns:a14="http://schemas.microsoft.com/office/drawing/2010/main" w="9525">
+                <a14:hiddenLine xmlns:a14="http://schemas.microsoft.com/office/drawing/2010/main" xmlns="" w="9525">
                   <a:solidFill>
                     <a:srgbClr val="000000"/>
                   </a:solidFill>
@@ -6888,7 +6888,7 @@
             </a:ln>
             <a:extLst>
               <a:ext uri="{91240B29-F687-4f45-9708-019B960494DF}">
-                <a14:hiddenLine xmlns="" xmlns:a14="http://schemas.microsoft.com/office/drawing/2010/main" w="9525">
+                <a14:hiddenLine xmlns:a14="http://schemas.microsoft.com/office/drawing/2010/main" xmlns="" w="9525">
                   <a:solidFill>
                     <a:srgbClr val="000000"/>
                   </a:solidFill>
@@ -7008,7 +7008,7 @@
             </a:ln>
             <a:extLst>
               <a:ext uri="{91240B29-F687-4f45-9708-019B960494DF}">
-                <a14:hiddenLine xmlns="" xmlns:a14="http://schemas.microsoft.com/office/drawing/2010/main" w="9525">
+                <a14:hiddenLine xmlns:a14="http://schemas.microsoft.com/office/drawing/2010/main" xmlns="" w="9525">
                   <a:solidFill>
                     <a:srgbClr val="000000"/>
                   </a:solidFill>
@@ -7076,7 +7076,7 @@
             </a:ln>
             <a:extLst>
               <a:ext uri="{91240B29-F687-4f45-9708-019B960494DF}">
-                <a14:hiddenLine xmlns="" xmlns:a14="http://schemas.microsoft.com/office/drawing/2010/main" w="9525">
+                <a14:hiddenLine xmlns:a14="http://schemas.microsoft.com/office/drawing/2010/main" xmlns="" w="9525">
                   <a:solidFill>
                     <a:srgbClr val="000000"/>
                   </a:solidFill>
@@ -7166,7 +7166,7 @@
             </a:ln>
             <a:extLst>
               <a:ext uri="{91240B29-F687-4f45-9708-019B960494DF}">
-                <a14:hiddenLine xmlns="" xmlns:a14="http://schemas.microsoft.com/office/drawing/2010/main" w="9525">
+                <a14:hiddenLine xmlns:a14="http://schemas.microsoft.com/office/drawing/2010/main" xmlns="" w="9525">
                   <a:solidFill>
                     <a:srgbClr val="000000"/>
                   </a:solidFill>
@@ -7306,7 +7306,7 @@
           <a:p>
             <a:fld id="{48A87A34-81AB-432B-8DAE-1953F412C126}" type="datetimeFigureOut">
               <a:rPr lang="en-US" dirty="0"/>
-              <a:t>11/30/22</a:t>
+              <a:t>12/2/2022</a:t>
             </a:fld>
             <a:endParaRPr lang="en-US" dirty="0"/>
           </a:p>
@@ -7568,7 +7568,7 @@
           <a:p>
             <a:fld id="{48A87A34-81AB-432B-8DAE-1953F412C126}" type="datetimeFigureOut">
               <a:rPr lang="en-US" dirty="0"/>
-              <a:t>11/30/22</a:t>
+              <a:t>12/2/2022</a:t>
             </a:fld>
             <a:endParaRPr lang="en-US" dirty="0"/>
           </a:p>
@@ -7759,7 +7759,7 @@
           <a:p>
             <a:fld id="{48A87A34-81AB-432B-8DAE-1953F412C126}" type="datetimeFigureOut">
               <a:rPr lang="en-US" dirty="0"/>
-              <a:t>11/30/22</a:t>
+              <a:t>12/2/2022</a:t>
             </a:fld>
             <a:endParaRPr lang="en-US" dirty="0"/>
           </a:p>
@@ -8017,7 +8017,7 @@
           <a:p>
             <a:fld id="{48A87A34-81AB-432B-8DAE-1953F412C126}" type="datetimeFigureOut">
               <a:rPr lang="en-US" dirty="0"/>
-              <a:t>11/30/22</a:t>
+              <a:t>12/2/2022</a:t>
             </a:fld>
             <a:endParaRPr lang="en-US" dirty="0"/>
           </a:p>
@@ -8446,7 +8446,7 @@
           <a:p>
             <a:fld id="{48A87A34-81AB-432B-8DAE-1953F412C126}" type="datetimeFigureOut">
               <a:rPr lang="en-US" dirty="0"/>
-              <a:t>11/30/22</a:t>
+              <a:t>12/2/2022</a:t>
             </a:fld>
             <a:endParaRPr lang="en-US" dirty="0"/>
           </a:p>
@@ -8987,7 +8987,7 @@
           <a:p>
             <a:fld id="{48A87A34-81AB-432B-8DAE-1953F412C126}" type="datetimeFigureOut">
               <a:rPr lang="en-US" dirty="0"/>
-              <a:t>11/30/22</a:t>
+              <a:t>12/2/2022</a:t>
             </a:fld>
             <a:endParaRPr lang="en-US" dirty="0"/>
           </a:p>
@@ -9702,7 +9702,7 @@
           <a:p>
             <a:fld id="{48A87A34-81AB-432B-8DAE-1953F412C126}" type="datetimeFigureOut">
               <a:rPr lang="en-US" dirty="0"/>
-              <a:t>11/30/22</a:t>
+              <a:t>12/2/2022</a:t>
             </a:fld>
             <a:endParaRPr lang="en-US" dirty="0"/>
           </a:p>
@@ -9867,7 +9867,7 @@
           <a:p>
             <a:fld id="{48A87A34-81AB-432B-8DAE-1953F412C126}" type="datetimeFigureOut">
               <a:rPr lang="en-US" dirty="0"/>
-              <a:t>11/30/22</a:t>
+              <a:t>12/2/2022</a:t>
             </a:fld>
             <a:endParaRPr lang="en-US" dirty="0"/>
           </a:p>
@@ -10042,7 +10042,7 @@
           <a:p>
             <a:fld id="{48A87A34-81AB-432B-8DAE-1953F412C126}" type="datetimeFigureOut">
               <a:rPr lang="en-US" dirty="0"/>
-              <a:t>11/30/22</a:t>
+              <a:t>12/2/2022</a:t>
             </a:fld>
             <a:endParaRPr lang="en-US" dirty="0"/>
           </a:p>
@@ -10207,7 +10207,7 @@
           <a:p>
             <a:fld id="{48A87A34-81AB-432B-8DAE-1953F412C126}" type="datetimeFigureOut">
               <a:rPr lang="en-US" dirty="0"/>
-              <a:t>11/30/22</a:t>
+              <a:t>12/2/2022</a:t>
             </a:fld>
             <a:endParaRPr lang="en-US" dirty="0"/>
           </a:p>
@@ -10452,7 +10452,7 @@
           <a:p>
             <a:fld id="{48A87A34-81AB-432B-8DAE-1953F412C126}" type="datetimeFigureOut">
               <a:rPr lang="en-US" dirty="0"/>
-              <a:t>11/30/22</a:t>
+              <a:t>12/2/2022</a:t>
             </a:fld>
             <a:endParaRPr lang="en-US" dirty="0"/>
           </a:p>
@@ -10679,7 +10679,7 @@
           <a:p>
             <a:fld id="{48A87A34-81AB-432B-8DAE-1953F412C126}" type="datetimeFigureOut">
               <a:rPr lang="en-US" dirty="0"/>
-              <a:t>11/30/22</a:t>
+              <a:t>12/2/2022</a:t>
             </a:fld>
             <a:endParaRPr lang="en-US" dirty="0"/>
           </a:p>
@@ -11055,7 +11055,7 @@
           <a:p>
             <a:fld id="{48A87A34-81AB-432B-8DAE-1953F412C126}" type="datetimeFigureOut">
               <a:rPr lang="en-US" dirty="0"/>
-              <a:t>11/30/22</a:t>
+              <a:t>12/2/2022</a:t>
             </a:fld>
             <a:endParaRPr lang="en-US" dirty="0"/>
           </a:p>
@@ -11168,7 +11168,7 @@
           <a:p>
             <a:fld id="{48A87A34-81AB-432B-8DAE-1953F412C126}" type="datetimeFigureOut">
               <a:rPr lang="en-US" dirty="0"/>
-              <a:t>11/30/22</a:t>
+              <a:t>12/2/2022</a:t>
             </a:fld>
             <a:endParaRPr lang="en-US" dirty="0"/>
           </a:p>
@@ -11258,7 +11258,7 @@
           <a:p>
             <a:fld id="{48A87A34-81AB-432B-8DAE-1953F412C126}" type="datetimeFigureOut">
               <a:rPr lang="en-US" dirty="0"/>
-              <a:t>11/30/22</a:t>
+              <a:t>12/2/2022</a:t>
             </a:fld>
             <a:endParaRPr lang="en-US" dirty="0"/>
           </a:p>
@@ -11502,7 +11502,7 @@
           <a:p>
             <a:fld id="{48A87A34-81AB-432B-8DAE-1953F412C126}" type="datetimeFigureOut">
               <a:rPr lang="en-US" dirty="0"/>
-              <a:t>11/30/22</a:t>
+              <a:t>12/2/2022</a:t>
             </a:fld>
             <a:endParaRPr lang="en-US" dirty="0"/>
           </a:p>
@@ -11777,7 +11777,7 @@
           <a:p>
             <a:fld id="{48A87A34-81AB-432B-8DAE-1953F412C126}" type="datetimeFigureOut">
               <a:rPr lang="en-US" dirty="0"/>
-              <a:t>11/30/22</a:t>
+              <a:t>12/2/2022</a:t>
             </a:fld>
             <a:endParaRPr lang="en-US" dirty="0"/>
           </a:p>
@@ -11888,7 +11888,7 @@
           <a:noFill/>
           <a:extLst>
             <a:ext uri="{909E8E84-426E-40dd-AFC4-6F175D3DCCD1}">
-              <a14:hiddenFill xmlns="" xmlns:a14="http://schemas.microsoft.com/office/drawing/2010/main">
+              <a14:hiddenFill xmlns:a14="http://schemas.microsoft.com/office/drawing/2010/main" xmlns="">
                 <a:solidFill>
                   <a:srgbClr val="FFFFFF"/>
                 </a:solidFill>
@@ -11962,7 +11962,7 @@
               </a:ln>
               <a:extLst>
                 <a:ext uri="{91240B29-F687-4f45-9708-019B960494DF}">
-                  <a14:hiddenLine xmlns="" xmlns:a14="http://schemas.microsoft.com/office/drawing/2010/main" w="9525">
+                  <a14:hiddenLine xmlns:a14="http://schemas.microsoft.com/office/drawing/2010/main" xmlns="" w="9525">
                     <a:solidFill>
                       <a:srgbClr val="000000"/>
                     </a:solidFill>
@@ -12052,7 +12052,7 @@
               </a:ln>
               <a:extLst>
                 <a:ext uri="{91240B29-F687-4f45-9708-019B960494DF}">
-                  <a14:hiddenLine xmlns="" xmlns:a14="http://schemas.microsoft.com/office/drawing/2010/main" w="9525">
+                  <a14:hiddenLine xmlns:a14="http://schemas.microsoft.com/office/drawing/2010/main" xmlns="" w="9525">
                     <a:solidFill>
                       <a:srgbClr val="000000"/>
                     </a:solidFill>
@@ -12142,7 +12142,7 @@
               </a:ln>
               <a:extLst>
                 <a:ext uri="{91240B29-F687-4f45-9708-019B960494DF}">
-                  <a14:hiddenLine xmlns="" xmlns:a14="http://schemas.microsoft.com/office/drawing/2010/main" w="9525">
+                  <a14:hiddenLine xmlns:a14="http://schemas.microsoft.com/office/drawing/2010/main" xmlns="" w="9525">
                     <a:solidFill>
                       <a:srgbClr val="000000"/>
                     </a:solidFill>
@@ -12204,7 +12204,7 @@
               </a:ln>
               <a:extLst>
                 <a:ext uri="{91240B29-F687-4f45-9708-019B960494DF}">
-                  <a14:hiddenLine xmlns="" xmlns:a14="http://schemas.microsoft.com/office/drawing/2010/main" w="9525">
+                  <a14:hiddenLine xmlns:a14="http://schemas.microsoft.com/office/drawing/2010/main" xmlns="" w="9525">
                     <a:solidFill>
                       <a:srgbClr val="000000"/>
                     </a:solidFill>
@@ -12294,7 +12294,7 @@
               </a:ln>
               <a:extLst>
                 <a:ext uri="{91240B29-F687-4f45-9708-019B960494DF}">
-                  <a14:hiddenLine xmlns="" xmlns:a14="http://schemas.microsoft.com/office/drawing/2010/main" w="9525">
+                  <a14:hiddenLine xmlns:a14="http://schemas.microsoft.com/office/drawing/2010/main" xmlns="" w="9525">
                     <a:solidFill>
                       <a:srgbClr val="000000"/>
                     </a:solidFill>
@@ -12356,7 +12356,7 @@
               </a:ln>
               <a:extLst>
                 <a:ext uri="{91240B29-F687-4f45-9708-019B960494DF}">
-                  <a14:hiddenLine xmlns="" xmlns:a14="http://schemas.microsoft.com/office/drawing/2010/main" w="9525">
+                  <a14:hiddenLine xmlns:a14="http://schemas.microsoft.com/office/drawing/2010/main" xmlns="" w="9525">
                     <a:solidFill>
                       <a:srgbClr val="000000"/>
                     </a:solidFill>
@@ -12418,7 +12418,7 @@
               </a:ln>
               <a:extLst>
                 <a:ext uri="{91240B29-F687-4f45-9708-019B960494DF}">
-                  <a14:hiddenLine xmlns="" xmlns:a14="http://schemas.microsoft.com/office/drawing/2010/main" w="9525">
+                  <a14:hiddenLine xmlns:a14="http://schemas.microsoft.com/office/drawing/2010/main" xmlns="" w="9525">
                     <a:solidFill>
                       <a:srgbClr val="000000"/>
                     </a:solidFill>
@@ -12508,7 +12508,7 @@
               </a:ln>
               <a:extLst>
                 <a:ext uri="{91240B29-F687-4f45-9708-019B960494DF}">
-                  <a14:hiddenLine xmlns="" xmlns:a14="http://schemas.microsoft.com/office/drawing/2010/main" w="9525">
+                  <a14:hiddenLine xmlns:a14="http://schemas.microsoft.com/office/drawing/2010/main" xmlns="" w="9525">
                     <a:solidFill>
                       <a:srgbClr val="000000"/>
                     </a:solidFill>
@@ -12598,7 +12598,7 @@
               </a:ln>
               <a:extLst>
                 <a:ext uri="{91240B29-F687-4f45-9708-019B960494DF}">
-                  <a14:hiddenLine xmlns="" xmlns:a14="http://schemas.microsoft.com/office/drawing/2010/main" w="9525">
+                  <a14:hiddenLine xmlns:a14="http://schemas.microsoft.com/office/drawing/2010/main" xmlns="" w="9525">
                     <a:solidFill>
                       <a:srgbClr val="000000"/>
                     </a:solidFill>
@@ -12660,7 +12660,7 @@
               </a:ln>
               <a:extLst>
                 <a:ext uri="{91240B29-F687-4f45-9708-019B960494DF}">
-                  <a14:hiddenLine xmlns="" xmlns:a14="http://schemas.microsoft.com/office/drawing/2010/main" w="9525">
+                  <a14:hiddenLine xmlns:a14="http://schemas.microsoft.com/office/drawing/2010/main" xmlns="" w="9525">
                     <a:solidFill>
                       <a:srgbClr val="000000"/>
                     </a:solidFill>
@@ -12770,7 +12770,7 @@
               </a:ln>
               <a:extLst>
                 <a:ext uri="{91240B29-F687-4f45-9708-019B960494DF}">
-                  <a14:hiddenLine xmlns="" xmlns:a14="http://schemas.microsoft.com/office/drawing/2010/main" w="9525">
+                  <a14:hiddenLine xmlns:a14="http://schemas.microsoft.com/office/drawing/2010/main" xmlns="" w="9525">
                     <a:solidFill>
                       <a:srgbClr val="000000"/>
                     </a:solidFill>
@@ -12854,7 +12854,7 @@
               </a:ln>
               <a:extLst>
                 <a:ext uri="{91240B29-F687-4f45-9708-019B960494DF}">
-                  <a14:hiddenLine xmlns="" xmlns:a14="http://schemas.microsoft.com/office/drawing/2010/main" w="9525">
+                  <a14:hiddenLine xmlns:a14="http://schemas.microsoft.com/office/drawing/2010/main" xmlns="" w="9525">
                     <a:solidFill>
                       <a:srgbClr val="000000"/>
                     </a:solidFill>
@@ -12916,7 +12916,7 @@
               </a:ln>
               <a:extLst>
                 <a:ext uri="{91240B29-F687-4f45-9708-019B960494DF}">
-                  <a14:hiddenLine xmlns="" xmlns:a14="http://schemas.microsoft.com/office/drawing/2010/main" w="9525">
+                  <a14:hiddenLine xmlns:a14="http://schemas.microsoft.com/office/drawing/2010/main" xmlns="" w="9525">
                     <a:solidFill>
                       <a:srgbClr val="000000"/>
                     </a:solidFill>
@@ -12978,7 +12978,7 @@
               </a:ln>
               <a:extLst>
                 <a:ext uri="{91240B29-F687-4f45-9708-019B960494DF}">
-                  <a14:hiddenLine xmlns="" xmlns:a14="http://schemas.microsoft.com/office/drawing/2010/main" w="9525">
+                  <a14:hiddenLine xmlns:a14="http://schemas.microsoft.com/office/drawing/2010/main" xmlns="" w="9525">
                     <a:solidFill>
                       <a:srgbClr val="000000"/>
                     </a:solidFill>
@@ -13068,7 +13068,7 @@
               </a:ln>
               <a:extLst>
                 <a:ext uri="{91240B29-F687-4f45-9708-019B960494DF}">
-                  <a14:hiddenLine xmlns="" xmlns:a14="http://schemas.microsoft.com/office/drawing/2010/main" w="9525">
+                  <a14:hiddenLine xmlns:a14="http://schemas.microsoft.com/office/drawing/2010/main" xmlns="" w="9525">
                     <a:solidFill>
                       <a:srgbClr val="000000"/>
                     </a:solidFill>
@@ -13102,7 +13102,7 @@
               </a:ln>
               <a:extLst>
                 <a:ext uri="{91240B29-F687-4f45-9708-019B960494DF}">
-                  <a14:hiddenLine xmlns="" xmlns:a14="http://schemas.microsoft.com/office/drawing/2010/main" w="9525">
+                  <a14:hiddenLine xmlns:a14="http://schemas.microsoft.com/office/drawing/2010/main" xmlns="" w="9525">
                     <a:solidFill>
                       <a:srgbClr val="000000"/>
                     </a:solidFill>
@@ -13167,7 +13167,7 @@
               </a:ln>
               <a:extLst>
                 <a:ext uri="{91240B29-F687-4f45-9708-019B960494DF}">
-                  <a14:hiddenLine xmlns="" xmlns:a14="http://schemas.microsoft.com/office/drawing/2010/main" w="9525">
+                  <a14:hiddenLine xmlns:a14="http://schemas.microsoft.com/office/drawing/2010/main" xmlns="" w="9525">
                     <a:solidFill>
                       <a:srgbClr val="000000"/>
                     </a:solidFill>
@@ -13257,7 +13257,7 @@
               </a:ln>
               <a:extLst>
                 <a:ext uri="{91240B29-F687-4f45-9708-019B960494DF}">
-                  <a14:hiddenLine xmlns="" xmlns:a14="http://schemas.microsoft.com/office/drawing/2010/main" w="9525">
+                  <a14:hiddenLine xmlns:a14="http://schemas.microsoft.com/office/drawing/2010/main" xmlns="" w="9525">
                     <a:solidFill>
                       <a:srgbClr val="000000"/>
                     </a:solidFill>
@@ -13319,7 +13319,7 @@
               </a:ln>
               <a:extLst>
                 <a:ext uri="{91240B29-F687-4f45-9708-019B960494DF}">
-                  <a14:hiddenLine xmlns="" xmlns:a14="http://schemas.microsoft.com/office/drawing/2010/main" w="9525">
+                  <a14:hiddenLine xmlns:a14="http://schemas.microsoft.com/office/drawing/2010/main" xmlns="" w="9525">
                     <a:solidFill>
                       <a:srgbClr val="000000"/>
                     </a:solidFill>
@@ -13409,7 +13409,7 @@
               </a:ln>
               <a:extLst>
                 <a:ext uri="{91240B29-F687-4f45-9708-019B960494DF}">
-                  <a14:hiddenLine xmlns="" xmlns:a14="http://schemas.microsoft.com/office/drawing/2010/main" w="9525">
+                  <a14:hiddenLine xmlns:a14="http://schemas.microsoft.com/office/drawing/2010/main" xmlns="" w="9525">
                     <a:solidFill>
                       <a:srgbClr val="000000"/>
                     </a:solidFill>
@@ -13474,7 +13474,7 @@
               </a:ln>
               <a:extLst>
                 <a:ext uri="{91240B29-F687-4f45-9708-019B960494DF}">
-                  <a14:hiddenLine xmlns="" xmlns:a14="http://schemas.microsoft.com/office/drawing/2010/main" w="9525">
+                  <a14:hiddenLine xmlns:a14="http://schemas.microsoft.com/office/drawing/2010/main" xmlns="" w="9525">
                     <a:solidFill>
                       <a:srgbClr val="000000"/>
                     </a:solidFill>
@@ -13536,7 +13536,7 @@
               </a:ln>
               <a:extLst>
                 <a:ext uri="{91240B29-F687-4f45-9708-019B960494DF}">
-                  <a14:hiddenLine xmlns="" xmlns:a14="http://schemas.microsoft.com/office/drawing/2010/main" w="9525">
+                  <a14:hiddenLine xmlns:a14="http://schemas.microsoft.com/office/drawing/2010/main" xmlns="" w="9525">
                     <a:solidFill>
                       <a:srgbClr val="000000"/>
                     </a:solidFill>
@@ -13626,7 +13626,7 @@
               </a:ln>
               <a:extLst>
                 <a:ext uri="{91240B29-F687-4f45-9708-019B960494DF}">
-                  <a14:hiddenLine xmlns="" xmlns:a14="http://schemas.microsoft.com/office/drawing/2010/main" w="9525">
+                  <a14:hiddenLine xmlns:a14="http://schemas.microsoft.com/office/drawing/2010/main" xmlns="" w="9525">
                     <a:solidFill>
                       <a:srgbClr val="000000"/>
                     </a:solidFill>
@@ -13716,7 +13716,7 @@
               </a:ln>
               <a:extLst>
                 <a:ext uri="{91240B29-F687-4f45-9708-019B960494DF}">
-                  <a14:hiddenLine xmlns="" xmlns:a14="http://schemas.microsoft.com/office/drawing/2010/main" w="9525">
+                  <a14:hiddenLine xmlns:a14="http://schemas.microsoft.com/office/drawing/2010/main" xmlns="" w="9525">
                     <a:solidFill>
                       <a:srgbClr val="000000"/>
                     </a:solidFill>
@@ -13781,7 +13781,7 @@
               </a:ln>
               <a:extLst>
                 <a:ext uri="{91240B29-F687-4f45-9708-019B960494DF}">
-                  <a14:hiddenLine xmlns="" xmlns:a14="http://schemas.microsoft.com/office/drawing/2010/main" w="9525">
+                  <a14:hiddenLine xmlns:a14="http://schemas.microsoft.com/office/drawing/2010/main" xmlns="" w="9525">
                     <a:solidFill>
                       <a:srgbClr val="000000"/>
                     </a:solidFill>
@@ -13901,7 +13901,7 @@
               </a:ln>
               <a:extLst>
                 <a:ext uri="{91240B29-F687-4f45-9708-019B960494DF}">
-                  <a14:hiddenLine xmlns="" xmlns:a14="http://schemas.microsoft.com/office/drawing/2010/main" w="9525">
+                  <a14:hiddenLine xmlns:a14="http://schemas.microsoft.com/office/drawing/2010/main" xmlns="" w="9525">
                     <a:solidFill>
                       <a:srgbClr val="000000"/>
                     </a:solidFill>
@@ -13999,7 +13999,7 @@
               </a:ln>
               <a:extLst>
                 <a:ext uri="{91240B29-F687-4f45-9708-019B960494DF}">
-                  <a14:hiddenLine xmlns="" xmlns:a14="http://schemas.microsoft.com/office/drawing/2010/main" w="9525">
+                  <a14:hiddenLine xmlns:a14="http://schemas.microsoft.com/office/drawing/2010/main" xmlns="" w="9525">
                     <a:solidFill>
                       <a:srgbClr val="000000"/>
                     </a:solidFill>
@@ -14114,7 +14114,7 @@
               </a:ln>
               <a:extLst>
                 <a:ext uri="{91240B29-F687-4f45-9708-019B960494DF}">
-                  <a14:hiddenLine xmlns="" xmlns:a14="http://schemas.microsoft.com/office/drawing/2010/main" w="9525">
+                  <a14:hiddenLine xmlns:a14="http://schemas.microsoft.com/office/drawing/2010/main" xmlns="" w="9525">
                     <a:solidFill>
                       <a:srgbClr val="000000"/>
                     </a:solidFill>
@@ -14204,7 +14204,7 @@
               </a:ln>
               <a:extLst>
                 <a:ext uri="{91240B29-F687-4f45-9708-019B960494DF}">
-                  <a14:hiddenLine xmlns="" xmlns:a14="http://schemas.microsoft.com/office/drawing/2010/main" w="9525">
+                  <a14:hiddenLine xmlns:a14="http://schemas.microsoft.com/office/drawing/2010/main" xmlns="" w="9525">
                     <a:solidFill>
                       <a:srgbClr val="000000"/>
                     </a:solidFill>
@@ -14269,7 +14269,7 @@
               </a:ln>
               <a:extLst>
                 <a:ext uri="{91240B29-F687-4f45-9708-019B960494DF}">
-                  <a14:hiddenLine xmlns="" xmlns:a14="http://schemas.microsoft.com/office/drawing/2010/main" w="9525">
+                  <a14:hiddenLine xmlns:a14="http://schemas.microsoft.com/office/drawing/2010/main" xmlns="" w="9525">
                     <a:solidFill>
                       <a:srgbClr val="000000"/>
                     </a:solidFill>
@@ -14359,7 +14359,7 @@
               </a:ln>
               <a:extLst>
                 <a:ext uri="{91240B29-F687-4f45-9708-019B960494DF}">
-                  <a14:hiddenLine xmlns="" xmlns:a14="http://schemas.microsoft.com/office/drawing/2010/main" w="9525">
+                  <a14:hiddenLine xmlns:a14="http://schemas.microsoft.com/office/drawing/2010/main" xmlns="" w="9525">
                     <a:solidFill>
                       <a:srgbClr val="000000"/>
                     </a:solidFill>
@@ -14427,7 +14427,7 @@
               </a:ln>
               <a:extLst>
                 <a:ext uri="{91240B29-F687-4f45-9708-019B960494DF}">
-                  <a14:hiddenLine xmlns="" xmlns:a14="http://schemas.microsoft.com/office/drawing/2010/main" w="9525">
+                  <a14:hiddenLine xmlns:a14="http://schemas.microsoft.com/office/drawing/2010/main" xmlns="" w="9525">
                     <a:solidFill>
                       <a:srgbClr val="000000"/>
                     </a:solidFill>
@@ -14517,7 +14517,7 @@
               </a:ln>
               <a:extLst>
                 <a:ext uri="{91240B29-F687-4f45-9708-019B960494DF}">
-                  <a14:hiddenLine xmlns="" xmlns:a14="http://schemas.microsoft.com/office/drawing/2010/main" w="9525">
+                  <a14:hiddenLine xmlns:a14="http://schemas.microsoft.com/office/drawing/2010/main" xmlns="" w="9525">
                     <a:solidFill>
                       <a:srgbClr val="000000"/>
                     </a:solidFill>
@@ -14585,7 +14585,7 @@
               </a:ln>
               <a:extLst>
                 <a:ext uri="{91240B29-F687-4f45-9708-019B960494DF}">
-                  <a14:hiddenLine xmlns="" xmlns:a14="http://schemas.microsoft.com/office/drawing/2010/main" w="9525">
+                  <a14:hiddenLine xmlns:a14="http://schemas.microsoft.com/office/drawing/2010/main" xmlns="" w="9525">
                     <a:solidFill>
                       <a:srgbClr val="000000"/>
                     </a:solidFill>
@@ -14675,7 +14675,7 @@
               </a:ln>
               <a:extLst>
                 <a:ext uri="{91240B29-F687-4f45-9708-019B960494DF}">
-                  <a14:hiddenLine xmlns="" xmlns:a14="http://schemas.microsoft.com/office/drawing/2010/main" w="9525">
+                  <a14:hiddenLine xmlns:a14="http://schemas.microsoft.com/office/drawing/2010/main" xmlns="" w="9525">
                     <a:solidFill>
                       <a:srgbClr val="000000"/>
                     </a:solidFill>
@@ -14709,7 +14709,7 @@
               </a:ln>
               <a:extLst>
                 <a:ext uri="{91240B29-F687-4f45-9708-019B960494DF}">
-                  <a14:hiddenLine xmlns="" xmlns:a14="http://schemas.microsoft.com/office/drawing/2010/main" w="9525">
+                  <a14:hiddenLine xmlns:a14="http://schemas.microsoft.com/office/drawing/2010/main" xmlns="" w="9525">
                     <a:solidFill>
                       <a:srgbClr val="000000"/>
                     </a:solidFill>
@@ -14850,7 +14850,7 @@
             <a:fld id="{48A87A34-81AB-432B-8DAE-1953F412C126}" type="datetimeFigureOut">
               <a:rPr lang="en-US" dirty="0"/>
               <a:pPr/>
-              <a:t>11/30/22</a:t>
+              <a:t>12/2/2022</a:t>
             </a:fld>
             <a:endParaRPr lang="en-US" dirty="0"/>
           </a:p>
@@ -15562,7 +15562,7 @@
           <a:noFill/>
           <a:extLst>
             <a:ext uri="{909E8E84-426E-40dd-AFC4-6F175D3DCCD1}">
-              <a14:hiddenFill xmlns="" xmlns:a16="http://schemas.microsoft.com/office/drawing/2014/main" xmlns:p14="http://schemas.microsoft.com/office/powerpoint/2010/main" xmlns:a14="http://schemas.microsoft.com/office/drawing/2010/main">
+              <a14:hiddenFill xmlns:a14="http://schemas.microsoft.com/office/drawing/2010/main" xmlns:p14="http://schemas.microsoft.com/office/powerpoint/2010/main" xmlns:a16="http://schemas.microsoft.com/office/drawing/2014/main" xmlns="">
                 <a:solidFill>
                   <a:srgbClr val="FFFFFF"/>
                 </a:solidFill>
@@ -15750,7 +15750,7 @@
             </a:ln>
             <a:extLst>
               <a:ext uri="{91240B29-F687-4f45-9708-019B960494DF}">
-                <a14:hiddenLine xmlns="" xmlns:a16="http://schemas.microsoft.com/office/drawing/2014/main" xmlns:p14="http://schemas.microsoft.com/office/powerpoint/2010/main" xmlns:a14="http://schemas.microsoft.com/office/drawing/2010/main" w="9525">
+                <a14:hiddenLine xmlns:a14="http://schemas.microsoft.com/office/drawing/2010/main" xmlns:p14="http://schemas.microsoft.com/office/powerpoint/2010/main" xmlns:a16="http://schemas.microsoft.com/office/drawing/2014/main" xmlns="" w="9525">
                   <a:solidFill>
                     <a:srgbClr val="000000"/>
                   </a:solidFill>
@@ -15855,7 +15855,7 @@
             </a:ln>
             <a:extLst>
               <a:ext uri="{91240B29-F687-4f45-9708-019B960494DF}">
-                <a14:hiddenLine xmlns="" xmlns:a16="http://schemas.microsoft.com/office/drawing/2014/main" xmlns:p14="http://schemas.microsoft.com/office/powerpoint/2010/main" xmlns:a14="http://schemas.microsoft.com/office/drawing/2010/main" w="9525">
+                <a14:hiddenLine xmlns:a14="http://schemas.microsoft.com/office/drawing/2010/main" xmlns:p14="http://schemas.microsoft.com/office/powerpoint/2010/main" xmlns:a16="http://schemas.microsoft.com/office/drawing/2014/main" xmlns="" w="9525">
                   <a:solidFill>
                     <a:srgbClr val="000000"/>
                   </a:solidFill>
@@ -15960,7 +15960,7 @@
             </a:ln>
             <a:extLst>
               <a:ext uri="{91240B29-F687-4f45-9708-019B960494DF}">
-                <a14:hiddenLine xmlns="" xmlns:a16="http://schemas.microsoft.com/office/drawing/2014/main" xmlns:p14="http://schemas.microsoft.com/office/powerpoint/2010/main" xmlns:a14="http://schemas.microsoft.com/office/drawing/2010/main" w="9525">
+                <a14:hiddenLine xmlns:a14="http://schemas.microsoft.com/office/drawing/2010/main" xmlns:p14="http://schemas.microsoft.com/office/powerpoint/2010/main" xmlns:a16="http://schemas.microsoft.com/office/drawing/2014/main" xmlns="" w="9525">
                   <a:solidFill>
                     <a:srgbClr val="000000"/>
                   </a:solidFill>
@@ -16037,7 +16037,7 @@
             </a:ln>
             <a:extLst>
               <a:ext uri="{91240B29-F687-4f45-9708-019B960494DF}">
-                <a14:hiddenLine xmlns="" xmlns:a16="http://schemas.microsoft.com/office/drawing/2014/main" xmlns:p14="http://schemas.microsoft.com/office/powerpoint/2010/main" xmlns:a14="http://schemas.microsoft.com/office/drawing/2010/main" w="9525">
+                <a14:hiddenLine xmlns:a14="http://schemas.microsoft.com/office/drawing/2010/main" xmlns:p14="http://schemas.microsoft.com/office/powerpoint/2010/main" xmlns:a16="http://schemas.microsoft.com/office/drawing/2014/main" xmlns="" w="9525">
                   <a:solidFill>
                     <a:srgbClr val="000000"/>
                   </a:solidFill>
@@ -16142,7 +16142,7 @@
             </a:ln>
             <a:extLst>
               <a:ext uri="{91240B29-F687-4f45-9708-019B960494DF}">
-                <a14:hiddenLine xmlns="" xmlns:a16="http://schemas.microsoft.com/office/drawing/2014/main" xmlns:p14="http://schemas.microsoft.com/office/powerpoint/2010/main" xmlns:a14="http://schemas.microsoft.com/office/drawing/2010/main" w="9525">
+                <a14:hiddenLine xmlns:a14="http://schemas.microsoft.com/office/drawing/2010/main" xmlns:p14="http://schemas.microsoft.com/office/powerpoint/2010/main" xmlns:a16="http://schemas.microsoft.com/office/drawing/2014/main" xmlns="" w="9525">
                   <a:solidFill>
                     <a:srgbClr val="000000"/>
                   </a:solidFill>
@@ -16219,7 +16219,7 @@
             </a:ln>
             <a:extLst>
               <a:ext uri="{91240B29-F687-4f45-9708-019B960494DF}">
-                <a14:hiddenLine xmlns="" xmlns:a16="http://schemas.microsoft.com/office/drawing/2014/main" xmlns:p14="http://schemas.microsoft.com/office/powerpoint/2010/main" xmlns:a14="http://schemas.microsoft.com/office/drawing/2010/main" w="9525">
+                <a14:hiddenLine xmlns:a14="http://schemas.microsoft.com/office/drawing/2010/main" xmlns:p14="http://schemas.microsoft.com/office/powerpoint/2010/main" xmlns:a16="http://schemas.microsoft.com/office/drawing/2014/main" xmlns="" w="9525">
                   <a:solidFill>
                     <a:srgbClr val="000000"/>
                   </a:solidFill>
@@ -16296,7 +16296,7 @@
             </a:ln>
             <a:extLst>
               <a:ext uri="{91240B29-F687-4f45-9708-019B960494DF}">
-                <a14:hiddenLine xmlns="" xmlns:a16="http://schemas.microsoft.com/office/drawing/2014/main" xmlns:p14="http://schemas.microsoft.com/office/powerpoint/2010/main" xmlns:a14="http://schemas.microsoft.com/office/drawing/2010/main" w="9525">
+                <a14:hiddenLine xmlns:a14="http://schemas.microsoft.com/office/drawing/2010/main" xmlns:p14="http://schemas.microsoft.com/office/powerpoint/2010/main" xmlns:a16="http://schemas.microsoft.com/office/drawing/2014/main" xmlns="" w="9525">
                   <a:solidFill>
                     <a:srgbClr val="000000"/>
                   </a:solidFill>
@@ -16401,7 +16401,7 @@
             </a:ln>
             <a:extLst>
               <a:ext uri="{91240B29-F687-4f45-9708-019B960494DF}">
-                <a14:hiddenLine xmlns="" xmlns:a16="http://schemas.microsoft.com/office/drawing/2014/main" xmlns:p14="http://schemas.microsoft.com/office/powerpoint/2010/main" xmlns:a14="http://schemas.microsoft.com/office/drawing/2010/main" w="9525">
+                <a14:hiddenLine xmlns:a14="http://schemas.microsoft.com/office/drawing/2010/main" xmlns:p14="http://schemas.microsoft.com/office/powerpoint/2010/main" xmlns:a16="http://schemas.microsoft.com/office/drawing/2014/main" xmlns="" w="9525">
                   <a:solidFill>
                     <a:srgbClr val="000000"/>
                   </a:solidFill>
@@ -16506,7 +16506,7 @@
             </a:ln>
             <a:extLst>
               <a:ext uri="{91240B29-F687-4f45-9708-019B960494DF}">
-                <a14:hiddenLine xmlns="" xmlns:a16="http://schemas.microsoft.com/office/drawing/2014/main" xmlns:p14="http://schemas.microsoft.com/office/powerpoint/2010/main" xmlns:a14="http://schemas.microsoft.com/office/drawing/2010/main" w="9525">
+                <a14:hiddenLine xmlns:a14="http://schemas.microsoft.com/office/drawing/2010/main" xmlns:p14="http://schemas.microsoft.com/office/powerpoint/2010/main" xmlns:a16="http://schemas.microsoft.com/office/drawing/2014/main" xmlns="" w="9525">
                   <a:solidFill>
                     <a:srgbClr val="000000"/>
                   </a:solidFill>
@@ -16583,7 +16583,7 @@
             </a:ln>
             <a:extLst>
               <a:ext uri="{91240B29-F687-4f45-9708-019B960494DF}">
-                <a14:hiddenLine xmlns="" xmlns:a16="http://schemas.microsoft.com/office/drawing/2014/main" xmlns:p14="http://schemas.microsoft.com/office/powerpoint/2010/main" xmlns:a14="http://schemas.microsoft.com/office/drawing/2010/main" w="9525">
+                <a14:hiddenLine xmlns:a14="http://schemas.microsoft.com/office/drawing/2010/main" xmlns:p14="http://schemas.microsoft.com/office/powerpoint/2010/main" xmlns:a16="http://schemas.microsoft.com/office/drawing/2014/main" xmlns="" w="9525">
                   <a:solidFill>
                     <a:srgbClr val="000000"/>
                   </a:solidFill>
@@ -16708,7 +16708,7 @@
             </a:ln>
             <a:extLst>
               <a:ext uri="{91240B29-F687-4f45-9708-019B960494DF}">
-                <a14:hiddenLine xmlns="" xmlns:a16="http://schemas.microsoft.com/office/drawing/2014/main" xmlns:p14="http://schemas.microsoft.com/office/powerpoint/2010/main" xmlns:a14="http://schemas.microsoft.com/office/drawing/2010/main" w="9525">
+                <a14:hiddenLine xmlns:a14="http://schemas.microsoft.com/office/drawing/2010/main" xmlns:p14="http://schemas.microsoft.com/office/powerpoint/2010/main" xmlns:a16="http://schemas.microsoft.com/office/drawing/2014/main" xmlns="" w="9525">
                   <a:solidFill>
                     <a:srgbClr val="000000"/>
                   </a:solidFill>
@@ -16822,7 +16822,7 @@
             </a:ln>
             <a:extLst>
               <a:ext uri="{91240B29-F687-4f45-9708-019B960494DF}">
-                <a14:hiddenLine xmlns="" xmlns:a16="http://schemas.microsoft.com/office/drawing/2014/main" xmlns:p14="http://schemas.microsoft.com/office/powerpoint/2010/main" xmlns:a14="http://schemas.microsoft.com/office/drawing/2010/main" w="9525">
+                <a14:hiddenLine xmlns:a14="http://schemas.microsoft.com/office/drawing/2010/main" xmlns:p14="http://schemas.microsoft.com/office/powerpoint/2010/main" xmlns:a16="http://schemas.microsoft.com/office/drawing/2014/main" xmlns="" w="9525">
                   <a:solidFill>
                     <a:srgbClr val="000000"/>
                   </a:solidFill>
@@ -16899,7 +16899,7 @@
             </a:ln>
             <a:extLst>
               <a:ext uri="{91240B29-F687-4f45-9708-019B960494DF}">
-                <a14:hiddenLine xmlns="" xmlns:a16="http://schemas.microsoft.com/office/drawing/2014/main" xmlns:p14="http://schemas.microsoft.com/office/powerpoint/2010/main" xmlns:a14="http://schemas.microsoft.com/office/drawing/2010/main" w="9525">
+                <a14:hiddenLine xmlns:a14="http://schemas.microsoft.com/office/drawing/2010/main" xmlns:p14="http://schemas.microsoft.com/office/powerpoint/2010/main" xmlns:a16="http://schemas.microsoft.com/office/drawing/2014/main" xmlns="" w="9525">
                   <a:solidFill>
                     <a:srgbClr val="000000"/>
                   </a:solidFill>
@@ -16976,7 +16976,7 @@
             </a:ln>
             <a:extLst>
               <a:ext uri="{91240B29-F687-4f45-9708-019B960494DF}">
-                <a14:hiddenLine xmlns="" xmlns:a16="http://schemas.microsoft.com/office/drawing/2014/main" xmlns:p14="http://schemas.microsoft.com/office/powerpoint/2010/main" xmlns:a14="http://schemas.microsoft.com/office/drawing/2010/main" w="9525">
+                <a14:hiddenLine xmlns:a14="http://schemas.microsoft.com/office/drawing/2010/main" xmlns:p14="http://schemas.microsoft.com/office/powerpoint/2010/main" xmlns:a16="http://schemas.microsoft.com/office/drawing/2014/main" xmlns="" w="9525">
                   <a:solidFill>
                     <a:srgbClr val="000000"/>
                   </a:solidFill>
@@ -17081,7 +17081,7 @@
             </a:ln>
             <a:extLst>
               <a:ext uri="{91240B29-F687-4f45-9708-019B960494DF}">
-                <a14:hiddenLine xmlns="" xmlns:a16="http://schemas.microsoft.com/office/drawing/2014/main" xmlns:p14="http://schemas.microsoft.com/office/powerpoint/2010/main" xmlns:a14="http://schemas.microsoft.com/office/drawing/2010/main" w="9525">
+                <a14:hiddenLine xmlns:a14="http://schemas.microsoft.com/office/drawing/2010/main" xmlns:p14="http://schemas.microsoft.com/office/powerpoint/2010/main" xmlns:a16="http://schemas.microsoft.com/office/drawing/2014/main" xmlns="" w="9525">
                   <a:solidFill>
                     <a:srgbClr val="000000"/>
                   </a:solidFill>
@@ -17130,7 +17130,7 @@
             </a:ln>
             <a:extLst>
               <a:ext uri="{91240B29-F687-4f45-9708-019B960494DF}">
-                <a14:hiddenLine xmlns="" xmlns:a16="http://schemas.microsoft.com/office/drawing/2014/main" xmlns:p14="http://schemas.microsoft.com/office/powerpoint/2010/main" xmlns:a14="http://schemas.microsoft.com/office/drawing/2010/main" w="9525">
+                <a14:hiddenLine xmlns:a14="http://schemas.microsoft.com/office/drawing/2010/main" xmlns:p14="http://schemas.microsoft.com/office/powerpoint/2010/main" xmlns:a16="http://schemas.microsoft.com/office/drawing/2014/main" xmlns="" w="9525">
                   <a:solidFill>
                     <a:srgbClr val="000000"/>
                   </a:solidFill>
@@ -17210,7 +17210,7 @@
             </a:ln>
             <a:extLst>
               <a:ext uri="{91240B29-F687-4f45-9708-019B960494DF}">
-                <a14:hiddenLine xmlns="" xmlns:a16="http://schemas.microsoft.com/office/drawing/2014/main" xmlns:p14="http://schemas.microsoft.com/office/powerpoint/2010/main" xmlns:a14="http://schemas.microsoft.com/office/drawing/2010/main" w="9525">
+                <a14:hiddenLine xmlns:a14="http://schemas.microsoft.com/office/drawing/2010/main" xmlns:p14="http://schemas.microsoft.com/office/powerpoint/2010/main" xmlns:a16="http://schemas.microsoft.com/office/drawing/2014/main" xmlns="" w="9525">
                   <a:solidFill>
                     <a:srgbClr val="000000"/>
                   </a:solidFill>
@@ -17315,7 +17315,7 @@
             </a:ln>
             <a:extLst>
               <a:ext uri="{91240B29-F687-4f45-9708-019B960494DF}">
-                <a14:hiddenLine xmlns="" xmlns:a16="http://schemas.microsoft.com/office/drawing/2014/main" xmlns:p14="http://schemas.microsoft.com/office/powerpoint/2010/main" xmlns:a14="http://schemas.microsoft.com/office/drawing/2010/main" w="9525">
+                <a14:hiddenLine xmlns:a14="http://schemas.microsoft.com/office/drawing/2010/main" xmlns:p14="http://schemas.microsoft.com/office/powerpoint/2010/main" xmlns:a16="http://schemas.microsoft.com/office/drawing/2014/main" xmlns="" w="9525">
                   <a:solidFill>
                     <a:srgbClr val="000000"/>
                   </a:solidFill>
@@ -17392,7 +17392,7 @@
             </a:ln>
             <a:extLst>
               <a:ext uri="{91240B29-F687-4f45-9708-019B960494DF}">
-                <a14:hiddenLine xmlns="" xmlns:a16="http://schemas.microsoft.com/office/drawing/2014/main" xmlns:p14="http://schemas.microsoft.com/office/powerpoint/2010/main" xmlns:a14="http://schemas.microsoft.com/office/drawing/2010/main" w="9525">
+                <a14:hiddenLine xmlns:a14="http://schemas.microsoft.com/office/drawing/2010/main" xmlns:p14="http://schemas.microsoft.com/office/powerpoint/2010/main" xmlns:a16="http://schemas.microsoft.com/office/drawing/2014/main" xmlns="" w="9525">
                   <a:solidFill>
                     <a:srgbClr val="000000"/>
                   </a:solidFill>
@@ -17497,7 +17497,7 @@
             </a:ln>
             <a:extLst>
               <a:ext uri="{91240B29-F687-4f45-9708-019B960494DF}">
-                <a14:hiddenLine xmlns="" xmlns:a16="http://schemas.microsoft.com/office/drawing/2014/main" xmlns:p14="http://schemas.microsoft.com/office/powerpoint/2010/main" xmlns:a14="http://schemas.microsoft.com/office/drawing/2010/main" w="9525">
+                <a14:hiddenLine xmlns:a14="http://schemas.microsoft.com/office/drawing/2010/main" xmlns:p14="http://schemas.microsoft.com/office/powerpoint/2010/main" xmlns:a16="http://schemas.microsoft.com/office/drawing/2014/main" xmlns="" w="9525">
                   <a:solidFill>
                     <a:srgbClr val="000000"/>
                   </a:solidFill>
@@ -17577,7 +17577,7 @@
             </a:ln>
             <a:extLst>
               <a:ext uri="{91240B29-F687-4f45-9708-019B960494DF}">
-                <a14:hiddenLine xmlns="" xmlns:a16="http://schemas.microsoft.com/office/drawing/2014/main" xmlns:p14="http://schemas.microsoft.com/office/powerpoint/2010/main" xmlns:a14="http://schemas.microsoft.com/office/drawing/2010/main" w="9525">
+                <a14:hiddenLine xmlns:a14="http://schemas.microsoft.com/office/drawing/2010/main" xmlns:p14="http://schemas.microsoft.com/office/powerpoint/2010/main" xmlns:a16="http://schemas.microsoft.com/office/drawing/2014/main" xmlns="" w="9525">
                   <a:solidFill>
                     <a:srgbClr val="000000"/>
                   </a:solidFill>
@@ -17654,7 +17654,7 @@
             </a:ln>
             <a:extLst>
               <a:ext uri="{91240B29-F687-4f45-9708-019B960494DF}">
-                <a14:hiddenLine xmlns="" xmlns:a16="http://schemas.microsoft.com/office/drawing/2014/main" xmlns:p14="http://schemas.microsoft.com/office/powerpoint/2010/main" xmlns:a14="http://schemas.microsoft.com/office/drawing/2010/main" w="9525">
+                <a14:hiddenLine xmlns:a14="http://schemas.microsoft.com/office/drawing/2010/main" xmlns:p14="http://schemas.microsoft.com/office/powerpoint/2010/main" xmlns:a16="http://schemas.microsoft.com/office/drawing/2014/main" xmlns="" w="9525">
                   <a:solidFill>
                     <a:srgbClr val="000000"/>
                   </a:solidFill>
@@ -17759,7 +17759,7 @@
             </a:ln>
             <a:extLst>
               <a:ext uri="{91240B29-F687-4f45-9708-019B960494DF}">
-                <a14:hiddenLine xmlns="" xmlns:a16="http://schemas.microsoft.com/office/drawing/2014/main" xmlns:p14="http://schemas.microsoft.com/office/powerpoint/2010/main" xmlns:a14="http://schemas.microsoft.com/office/drawing/2010/main" w="9525">
+                <a14:hiddenLine xmlns:a14="http://schemas.microsoft.com/office/drawing/2010/main" xmlns:p14="http://schemas.microsoft.com/office/powerpoint/2010/main" xmlns:a16="http://schemas.microsoft.com/office/drawing/2014/main" xmlns="" w="9525">
                   <a:solidFill>
                     <a:srgbClr val="000000"/>
                   </a:solidFill>
@@ -17864,7 +17864,7 @@
             </a:ln>
             <a:extLst>
               <a:ext uri="{91240B29-F687-4f45-9708-019B960494DF}">
-                <a14:hiddenLine xmlns="" xmlns:a16="http://schemas.microsoft.com/office/drawing/2014/main" xmlns:p14="http://schemas.microsoft.com/office/powerpoint/2010/main" xmlns:a14="http://schemas.microsoft.com/office/drawing/2010/main" w="9525">
+                <a14:hiddenLine xmlns:a14="http://schemas.microsoft.com/office/drawing/2010/main" xmlns:p14="http://schemas.microsoft.com/office/powerpoint/2010/main" xmlns:a16="http://schemas.microsoft.com/office/drawing/2014/main" xmlns="" w="9525">
                   <a:solidFill>
                     <a:srgbClr val="000000"/>
                   </a:solidFill>
@@ -17944,7 +17944,7 @@
             </a:ln>
             <a:extLst>
               <a:ext uri="{91240B29-F687-4f45-9708-019B960494DF}">
-                <a14:hiddenLine xmlns="" xmlns:a16="http://schemas.microsoft.com/office/drawing/2014/main" xmlns:p14="http://schemas.microsoft.com/office/powerpoint/2010/main" xmlns:a14="http://schemas.microsoft.com/office/drawing/2010/main" w="9525">
+                <a14:hiddenLine xmlns:a14="http://schemas.microsoft.com/office/drawing/2010/main" xmlns:p14="http://schemas.microsoft.com/office/powerpoint/2010/main" xmlns:a16="http://schemas.microsoft.com/office/drawing/2014/main" xmlns="" w="9525">
                   <a:solidFill>
                     <a:srgbClr val="000000"/>
                   </a:solidFill>
@@ -18079,7 +18079,7 @@
             </a:ln>
             <a:extLst>
               <a:ext uri="{91240B29-F687-4f45-9708-019B960494DF}">
-                <a14:hiddenLine xmlns="" xmlns:a16="http://schemas.microsoft.com/office/drawing/2014/main" xmlns:p14="http://schemas.microsoft.com/office/powerpoint/2010/main" xmlns:a14="http://schemas.microsoft.com/office/drawing/2010/main" w="9525">
+                <a14:hiddenLine xmlns:a14="http://schemas.microsoft.com/office/drawing/2010/main" xmlns:p14="http://schemas.microsoft.com/office/powerpoint/2010/main" xmlns:a16="http://schemas.microsoft.com/office/drawing/2014/main" xmlns="" w="9525">
                   <a:solidFill>
                     <a:srgbClr val="000000"/>
                   </a:solidFill>
@@ -18450,13 +18450,13 @@
         </p:nvSpPr>
         <p:spPr>
           <a:xfrm>
-            <a:off x="5585792" y="1336813"/>
+            <a:off x="5591653" y="1336813"/>
             <a:ext cx="5235460" cy="4184374"/>
           </a:xfrm>
         </p:spPr>
         <p:txBody>
           <a:bodyPr anchor="ctr">
-            <a:normAutofit/>
+            <a:normAutofit fontScale="85000" lnSpcReduction="10000"/>
           </a:bodyPr>
           <a:lstStyle/>
           <a:p>
@@ -18514,6 +18514,28 @@
                 <a:hlinkClick r:id="rId5"/>
               </a:rPr>
               <a:t>https://github.com/rserran/fpp3_exercises</a:t>
+            </a:r>
+            <a:endParaRPr lang="en-US" dirty="0"/>
+          </a:p>
+          <a:p>
+            <a:r>
+              <a:rPr lang="en-US" dirty="0" err="1"/>
+              <a:t>Modeltime</a:t>
+            </a:r>
+            <a:r>
+              <a:rPr lang="en-US" dirty="0"/>
+              <a:t> R package</a:t>
+            </a:r>
+          </a:p>
+          <a:p>
+            <a:pPr marL="0" indent="0">
+              <a:buNone/>
+            </a:pPr>
+            <a:r>
+              <a:rPr lang="en-US" dirty="0">
+                <a:hlinkClick r:id="rId6"/>
+              </a:rPr>
+              <a:t>https://cran.r-project.org/web/packages/modeltime/vignettes/getting-started-with-modeltime.html</a:t>
             </a:r>
             <a:endParaRPr lang="en-US" dirty="0"/>
           </a:p>
@@ -18681,7 +18703,7 @@
           <a:noFill/>
           <a:extLst>
             <a:ext uri="{909E8E84-426E-40dd-AFC4-6F175D3DCCD1}">
-              <a14:hiddenFill xmlns:a14="http://schemas.microsoft.com/office/drawing/2010/main" xmlns:p14="http://schemas.microsoft.com/office/powerpoint/2010/main" xmlns:a16="http://schemas.microsoft.com/office/drawing/2014/main" xmlns="">
+              <a14:hiddenFill xmlns="" xmlns:a16="http://schemas.microsoft.com/office/drawing/2014/main" xmlns:p14="http://schemas.microsoft.com/office/powerpoint/2010/main" xmlns:a14="http://schemas.microsoft.com/office/drawing/2010/main">
                 <a:solidFill>
                   <a:srgbClr val="FFFFFF"/>
                 </a:solidFill>
@@ -18888,7 +18910,7 @@
             </a:ln>
             <a:extLst>
               <a:ext uri="{91240B29-F687-4f45-9708-019B960494DF}">
-                <a14:hiddenLine xmlns:a14="http://schemas.microsoft.com/office/drawing/2010/main" xmlns:p14="http://schemas.microsoft.com/office/powerpoint/2010/main" xmlns:a16="http://schemas.microsoft.com/office/drawing/2014/main" xmlns="" w="9525">
+                <a14:hiddenLine xmlns="" xmlns:a16="http://schemas.microsoft.com/office/drawing/2014/main" xmlns:p14="http://schemas.microsoft.com/office/powerpoint/2010/main" xmlns:a14="http://schemas.microsoft.com/office/drawing/2010/main" w="9525">
                   <a:solidFill>
                     <a:srgbClr val="000000"/>
                   </a:solidFill>
@@ -18993,7 +19015,7 @@
             </a:ln>
             <a:extLst>
               <a:ext uri="{91240B29-F687-4f45-9708-019B960494DF}">
-                <a14:hiddenLine xmlns:a14="http://schemas.microsoft.com/office/drawing/2010/main" xmlns:p14="http://schemas.microsoft.com/office/powerpoint/2010/main" xmlns:a16="http://schemas.microsoft.com/office/drawing/2014/main" xmlns="" w="9525">
+                <a14:hiddenLine xmlns="" xmlns:a16="http://schemas.microsoft.com/office/drawing/2014/main" xmlns:p14="http://schemas.microsoft.com/office/powerpoint/2010/main" xmlns:a14="http://schemas.microsoft.com/office/drawing/2010/main" w="9525">
                   <a:solidFill>
                     <a:srgbClr val="000000"/>
                   </a:solidFill>
@@ -19098,7 +19120,7 @@
             </a:ln>
             <a:extLst>
               <a:ext uri="{91240B29-F687-4f45-9708-019B960494DF}">
-                <a14:hiddenLine xmlns:a14="http://schemas.microsoft.com/office/drawing/2010/main" xmlns:p14="http://schemas.microsoft.com/office/powerpoint/2010/main" xmlns:a16="http://schemas.microsoft.com/office/drawing/2014/main" xmlns="" w="9525">
+                <a14:hiddenLine xmlns="" xmlns:a16="http://schemas.microsoft.com/office/drawing/2014/main" xmlns:p14="http://schemas.microsoft.com/office/powerpoint/2010/main" xmlns:a14="http://schemas.microsoft.com/office/drawing/2010/main" w="9525">
                   <a:solidFill>
                     <a:srgbClr val="000000"/>
                   </a:solidFill>
@@ -19175,7 +19197,7 @@
             </a:ln>
             <a:extLst>
               <a:ext uri="{91240B29-F687-4f45-9708-019B960494DF}">
-                <a14:hiddenLine xmlns:a14="http://schemas.microsoft.com/office/drawing/2010/main" xmlns:p14="http://schemas.microsoft.com/office/powerpoint/2010/main" xmlns:a16="http://schemas.microsoft.com/office/drawing/2014/main" xmlns="" w="9525">
+                <a14:hiddenLine xmlns="" xmlns:a16="http://schemas.microsoft.com/office/drawing/2014/main" xmlns:p14="http://schemas.microsoft.com/office/powerpoint/2010/main" xmlns:a14="http://schemas.microsoft.com/office/drawing/2010/main" w="9525">
                   <a:solidFill>
                     <a:srgbClr val="000000"/>
                   </a:solidFill>
@@ -19280,7 +19302,7 @@
             </a:ln>
             <a:extLst>
               <a:ext uri="{91240B29-F687-4f45-9708-019B960494DF}">
-                <a14:hiddenLine xmlns:a14="http://schemas.microsoft.com/office/drawing/2010/main" xmlns:p14="http://schemas.microsoft.com/office/powerpoint/2010/main" xmlns:a16="http://schemas.microsoft.com/office/drawing/2014/main" xmlns="" w="9525">
+                <a14:hiddenLine xmlns="" xmlns:a16="http://schemas.microsoft.com/office/drawing/2014/main" xmlns:p14="http://schemas.microsoft.com/office/powerpoint/2010/main" xmlns:a14="http://schemas.microsoft.com/office/drawing/2010/main" w="9525">
                   <a:solidFill>
                     <a:srgbClr val="000000"/>
                   </a:solidFill>
@@ -19357,7 +19379,7 @@
             </a:ln>
             <a:extLst>
               <a:ext uri="{91240B29-F687-4f45-9708-019B960494DF}">
-                <a14:hiddenLine xmlns:a14="http://schemas.microsoft.com/office/drawing/2010/main" xmlns:p14="http://schemas.microsoft.com/office/powerpoint/2010/main" xmlns:a16="http://schemas.microsoft.com/office/drawing/2014/main" xmlns="" w="9525">
+                <a14:hiddenLine xmlns="" xmlns:a16="http://schemas.microsoft.com/office/drawing/2014/main" xmlns:p14="http://schemas.microsoft.com/office/powerpoint/2010/main" xmlns:a14="http://schemas.microsoft.com/office/drawing/2010/main" w="9525">
                   <a:solidFill>
                     <a:srgbClr val="000000"/>
                   </a:solidFill>
@@ -19434,7 +19456,7 @@
             </a:ln>
             <a:extLst>
               <a:ext uri="{91240B29-F687-4f45-9708-019B960494DF}">
-                <a14:hiddenLine xmlns:a14="http://schemas.microsoft.com/office/drawing/2010/main" xmlns:p14="http://schemas.microsoft.com/office/powerpoint/2010/main" xmlns:a16="http://schemas.microsoft.com/office/drawing/2014/main" xmlns="" w="9525">
+                <a14:hiddenLine xmlns="" xmlns:a16="http://schemas.microsoft.com/office/drawing/2014/main" xmlns:p14="http://schemas.microsoft.com/office/powerpoint/2010/main" xmlns:a14="http://schemas.microsoft.com/office/drawing/2010/main" w="9525">
                   <a:solidFill>
                     <a:srgbClr val="000000"/>
                   </a:solidFill>
@@ -19539,7 +19561,7 @@
             </a:ln>
             <a:extLst>
               <a:ext uri="{91240B29-F687-4f45-9708-019B960494DF}">
-                <a14:hiddenLine xmlns:a14="http://schemas.microsoft.com/office/drawing/2010/main" xmlns:p14="http://schemas.microsoft.com/office/powerpoint/2010/main" xmlns:a16="http://schemas.microsoft.com/office/drawing/2014/main" xmlns="" w="9525">
+                <a14:hiddenLine xmlns="" xmlns:a16="http://schemas.microsoft.com/office/drawing/2014/main" xmlns:p14="http://schemas.microsoft.com/office/powerpoint/2010/main" xmlns:a14="http://schemas.microsoft.com/office/drawing/2010/main" w="9525">
                   <a:solidFill>
                     <a:srgbClr val="000000"/>
                   </a:solidFill>
@@ -19644,7 +19666,7 @@
             </a:ln>
             <a:extLst>
               <a:ext uri="{91240B29-F687-4f45-9708-019B960494DF}">
-                <a14:hiddenLine xmlns:a14="http://schemas.microsoft.com/office/drawing/2010/main" xmlns:p14="http://schemas.microsoft.com/office/powerpoint/2010/main" xmlns:a16="http://schemas.microsoft.com/office/drawing/2014/main" xmlns="" w="9525">
+                <a14:hiddenLine xmlns="" xmlns:a16="http://schemas.microsoft.com/office/drawing/2014/main" xmlns:p14="http://schemas.microsoft.com/office/powerpoint/2010/main" xmlns:a14="http://schemas.microsoft.com/office/drawing/2010/main" w="9525">
                   <a:solidFill>
                     <a:srgbClr val="000000"/>
                   </a:solidFill>
@@ -19721,7 +19743,7 @@
             </a:ln>
             <a:extLst>
               <a:ext uri="{91240B29-F687-4f45-9708-019B960494DF}">
-                <a14:hiddenLine xmlns:a14="http://schemas.microsoft.com/office/drawing/2010/main" xmlns:p14="http://schemas.microsoft.com/office/powerpoint/2010/main" xmlns:a16="http://schemas.microsoft.com/office/drawing/2014/main" xmlns="" w="9525">
+                <a14:hiddenLine xmlns="" xmlns:a16="http://schemas.microsoft.com/office/drawing/2014/main" xmlns:p14="http://schemas.microsoft.com/office/powerpoint/2010/main" xmlns:a14="http://schemas.microsoft.com/office/drawing/2010/main" w="9525">
                   <a:solidFill>
                     <a:srgbClr val="000000"/>
                   </a:solidFill>
@@ -19846,7 +19868,7 @@
             </a:ln>
             <a:extLst>
               <a:ext uri="{91240B29-F687-4f45-9708-019B960494DF}">
-                <a14:hiddenLine xmlns:a14="http://schemas.microsoft.com/office/drawing/2010/main" xmlns:p14="http://schemas.microsoft.com/office/powerpoint/2010/main" xmlns:a16="http://schemas.microsoft.com/office/drawing/2014/main" xmlns="" w="9525">
+                <a14:hiddenLine xmlns="" xmlns:a16="http://schemas.microsoft.com/office/drawing/2014/main" xmlns:p14="http://schemas.microsoft.com/office/powerpoint/2010/main" xmlns:a14="http://schemas.microsoft.com/office/drawing/2010/main" w="9525">
                   <a:solidFill>
                     <a:srgbClr val="000000"/>
                   </a:solidFill>
@@ -19960,7 +19982,7 @@
             </a:ln>
             <a:extLst>
               <a:ext uri="{91240B29-F687-4f45-9708-019B960494DF}">
-                <a14:hiddenLine xmlns:a14="http://schemas.microsoft.com/office/drawing/2010/main" xmlns:p14="http://schemas.microsoft.com/office/powerpoint/2010/main" xmlns:a16="http://schemas.microsoft.com/office/drawing/2014/main" xmlns="" w="9525">
+                <a14:hiddenLine xmlns="" xmlns:a16="http://schemas.microsoft.com/office/drawing/2014/main" xmlns:p14="http://schemas.microsoft.com/office/powerpoint/2010/main" xmlns:a14="http://schemas.microsoft.com/office/drawing/2010/main" w="9525">
                   <a:solidFill>
                     <a:srgbClr val="000000"/>
                   </a:solidFill>
@@ -20037,7 +20059,7 @@
             </a:ln>
             <a:extLst>
               <a:ext uri="{91240B29-F687-4f45-9708-019B960494DF}">
-                <a14:hiddenLine xmlns:a14="http://schemas.microsoft.com/office/drawing/2010/main" xmlns:p14="http://schemas.microsoft.com/office/powerpoint/2010/main" xmlns:a16="http://schemas.microsoft.com/office/drawing/2014/main" xmlns="" w="9525">
+                <a14:hiddenLine xmlns="" xmlns:a16="http://schemas.microsoft.com/office/drawing/2014/main" xmlns:p14="http://schemas.microsoft.com/office/powerpoint/2010/main" xmlns:a14="http://schemas.microsoft.com/office/drawing/2010/main" w="9525">
                   <a:solidFill>
                     <a:srgbClr val="000000"/>
                   </a:solidFill>
@@ -20114,7 +20136,7 @@
             </a:ln>
             <a:extLst>
               <a:ext uri="{91240B29-F687-4f45-9708-019B960494DF}">
-                <a14:hiddenLine xmlns:a14="http://schemas.microsoft.com/office/drawing/2010/main" xmlns:p14="http://schemas.microsoft.com/office/powerpoint/2010/main" xmlns:a16="http://schemas.microsoft.com/office/drawing/2014/main" xmlns="" w="9525">
+                <a14:hiddenLine xmlns="" xmlns:a16="http://schemas.microsoft.com/office/drawing/2014/main" xmlns:p14="http://schemas.microsoft.com/office/powerpoint/2010/main" xmlns:a14="http://schemas.microsoft.com/office/drawing/2010/main" w="9525">
                   <a:solidFill>
                     <a:srgbClr val="000000"/>
                   </a:solidFill>
@@ -20219,7 +20241,7 @@
             </a:ln>
             <a:extLst>
               <a:ext uri="{91240B29-F687-4f45-9708-019B960494DF}">
-                <a14:hiddenLine xmlns:a14="http://schemas.microsoft.com/office/drawing/2010/main" xmlns:p14="http://schemas.microsoft.com/office/powerpoint/2010/main" xmlns:a16="http://schemas.microsoft.com/office/drawing/2014/main" xmlns="" w="9525">
+                <a14:hiddenLine xmlns="" xmlns:a16="http://schemas.microsoft.com/office/drawing/2014/main" xmlns:p14="http://schemas.microsoft.com/office/powerpoint/2010/main" xmlns:a14="http://schemas.microsoft.com/office/drawing/2010/main" w="9525">
                   <a:solidFill>
                     <a:srgbClr val="000000"/>
                   </a:solidFill>
@@ -20268,7 +20290,7 @@
             </a:ln>
             <a:extLst>
               <a:ext uri="{91240B29-F687-4f45-9708-019B960494DF}">
-                <a14:hiddenLine xmlns:a14="http://schemas.microsoft.com/office/drawing/2010/main" xmlns:p14="http://schemas.microsoft.com/office/powerpoint/2010/main" xmlns:a16="http://schemas.microsoft.com/office/drawing/2014/main" xmlns="" w="9525">
+                <a14:hiddenLine xmlns="" xmlns:a16="http://schemas.microsoft.com/office/drawing/2014/main" xmlns:p14="http://schemas.microsoft.com/office/powerpoint/2010/main" xmlns:a14="http://schemas.microsoft.com/office/drawing/2010/main" w="9525">
                   <a:solidFill>
                     <a:srgbClr val="000000"/>
                   </a:solidFill>
@@ -20348,7 +20370,7 @@
             </a:ln>
             <a:extLst>
               <a:ext uri="{91240B29-F687-4f45-9708-019B960494DF}">
-                <a14:hiddenLine xmlns:a14="http://schemas.microsoft.com/office/drawing/2010/main" xmlns:p14="http://schemas.microsoft.com/office/powerpoint/2010/main" xmlns:a16="http://schemas.microsoft.com/office/drawing/2014/main" xmlns="" w="9525">
+                <a14:hiddenLine xmlns="" xmlns:a16="http://schemas.microsoft.com/office/drawing/2014/main" xmlns:p14="http://schemas.microsoft.com/office/powerpoint/2010/main" xmlns:a14="http://schemas.microsoft.com/office/drawing/2010/main" w="9525">
                   <a:solidFill>
                     <a:srgbClr val="000000"/>
                   </a:solidFill>
@@ -20453,7 +20475,7 @@
             </a:ln>
             <a:extLst>
               <a:ext uri="{91240B29-F687-4f45-9708-019B960494DF}">
-                <a14:hiddenLine xmlns:a14="http://schemas.microsoft.com/office/drawing/2010/main" xmlns:p14="http://schemas.microsoft.com/office/powerpoint/2010/main" xmlns:a16="http://schemas.microsoft.com/office/drawing/2014/main" xmlns="" w="9525">
+                <a14:hiddenLine xmlns="" xmlns:a16="http://schemas.microsoft.com/office/drawing/2014/main" xmlns:p14="http://schemas.microsoft.com/office/powerpoint/2010/main" xmlns:a14="http://schemas.microsoft.com/office/drawing/2010/main" w="9525">
                   <a:solidFill>
                     <a:srgbClr val="000000"/>
                   </a:solidFill>
@@ -20530,7 +20552,7 @@
             </a:ln>
             <a:extLst>
               <a:ext uri="{91240B29-F687-4f45-9708-019B960494DF}">
-                <a14:hiddenLine xmlns:a14="http://schemas.microsoft.com/office/drawing/2010/main" xmlns:p14="http://schemas.microsoft.com/office/powerpoint/2010/main" xmlns:a16="http://schemas.microsoft.com/office/drawing/2014/main" xmlns="" w="9525">
+                <a14:hiddenLine xmlns="" xmlns:a16="http://schemas.microsoft.com/office/drawing/2014/main" xmlns:p14="http://schemas.microsoft.com/office/powerpoint/2010/main" xmlns:a14="http://schemas.microsoft.com/office/drawing/2010/main" w="9525">
                   <a:solidFill>
                     <a:srgbClr val="000000"/>
                   </a:solidFill>
@@ -20635,7 +20657,7 @@
             </a:ln>
             <a:extLst>
               <a:ext uri="{91240B29-F687-4f45-9708-019B960494DF}">
-                <a14:hiddenLine xmlns:a14="http://schemas.microsoft.com/office/drawing/2010/main" xmlns:p14="http://schemas.microsoft.com/office/powerpoint/2010/main" xmlns:a16="http://schemas.microsoft.com/office/drawing/2014/main" xmlns="" w="9525">
+                <a14:hiddenLine xmlns="" xmlns:a16="http://schemas.microsoft.com/office/drawing/2014/main" xmlns:p14="http://schemas.microsoft.com/office/powerpoint/2010/main" xmlns:a14="http://schemas.microsoft.com/office/drawing/2010/main" w="9525">
                   <a:solidFill>
                     <a:srgbClr val="000000"/>
                   </a:solidFill>
@@ -20715,7 +20737,7 @@
             </a:ln>
             <a:extLst>
               <a:ext uri="{91240B29-F687-4f45-9708-019B960494DF}">
-                <a14:hiddenLine xmlns:a14="http://schemas.microsoft.com/office/drawing/2010/main" xmlns:p14="http://schemas.microsoft.com/office/powerpoint/2010/main" xmlns:a16="http://schemas.microsoft.com/office/drawing/2014/main" xmlns="" w="9525">
+                <a14:hiddenLine xmlns="" xmlns:a16="http://schemas.microsoft.com/office/drawing/2014/main" xmlns:p14="http://schemas.microsoft.com/office/powerpoint/2010/main" xmlns:a14="http://schemas.microsoft.com/office/drawing/2010/main" w="9525">
                   <a:solidFill>
                     <a:srgbClr val="000000"/>
                   </a:solidFill>
@@ -20792,7 +20814,7 @@
             </a:ln>
             <a:extLst>
               <a:ext uri="{91240B29-F687-4f45-9708-019B960494DF}">
-                <a14:hiddenLine xmlns:a14="http://schemas.microsoft.com/office/drawing/2010/main" xmlns:p14="http://schemas.microsoft.com/office/powerpoint/2010/main" xmlns:a16="http://schemas.microsoft.com/office/drawing/2014/main" xmlns="" w="9525">
+                <a14:hiddenLine xmlns="" xmlns:a16="http://schemas.microsoft.com/office/drawing/2014/main" xmlns:p14="http://schemas.microsoft.com/office/powerpoint/2010/main" xmlns:a14="http://schemas.microsoft.com/office/drawing/2010/main" w="9525">
                   <a:solidFill>
                     <a:srgbClr val="000000"/>
                   </a:solidFill>
@@ -20897,7 +20919,7 @@
             </a:ln>
             <a:extLst>
               <a:ext uri="{91240B29-F687-4f45-9708-019B960494DF}">
-                <a14:hiddenLine xmlns:a14="http://schemas.microsoft.com/office/drawing/2010/main" xmlns:p14="http://schemas.microsoft.com/office/powerpoint/2010/main" xmlns:a16="http://schemas.microsoft.com/office/drawing/2014/main" xmlns="" w="9525">
+                <a14:hiddenLine xmlns="" xmlns:a16="http://schemas.microsoft.com/office/drawing/2014/main" xmlns:p14="http://schemas.microsoft.com/office/powerpoint/2010/main" xmlns:a14="http://schemas.microsoft.com/office/drawing/2010/main" w="9525">
                   <a:solidFill>
                     <a:srgbClr val="000000"/>
                   </a:solidFill>
@@ -21002,7 +21024,7 @@
             </a:ln>
             <a:extLst>
               <a:ext uri="{91240B29-F687-4f45-9708-019B960494DF}">
-                <a14:hiddenLine xmlns:a14="http://schemas.microsoft.com/office/drawing/2010/main" xmlns:p14="http://schemas.microsoft.com/office/powerpoint/2010/main" xmlns:a16="http://schemas.microsoft.com/office/drawing/2014/main" xmlns="" w="9525">
+                <a14:hiddenLine xmlns="" xmlns:a16="http://schemas.microsoft.com/office/drawing/2014/main" xmlns:p14="http://schemas.microsoft.com/office/powerpoint/2010/main" xmlns:a14="http://schemas.microsoft.com/office/drawing/2010/main" w="9525">
                   <a:solidFill>
                     <a:srgbClr val="000000"/>
                   </a:solidFill>
@@ -21082,7 +21104,7 @@
             </a:ln>
             <a:extLst>
               <a:ext uri="{91240B29-F687-4f45-9708-019B960494DF}">
-                <a14:hiddenLine xmlns:a14="http://schemas.microsoft.com/office/drawing/2010/main" xmlns:p14="http://schemas.microsoft.com/office/powerpoint/2010/main" xmlns:a16="http://schemas.microsoft.com/office/drawing/2014/main" xmlns="" w="9525">
+                <a14:hiddenLine xmlns="" xmlns:a16="http://schemas.microsoft.com/office/drawing/2014/main" xmlns:p14="http://schemas.microsoft.com/office/powerpoint/2010/main" xmlns:a14="http://schemas.microsoft.com/office/drawing/2010/main" w="9525">
                   <a:solidFill>
                     <a:srgbClr val="000000"/>
                   </a:solidFill>
@@ -21217,7 +21239,7 @@
             </a:ln>
             <a:extLst>
               <a:ext uri="{91240B29-F687-4f45-9708-019B960494DF}">
-                <a14:hiddenLine xmlns:a14="http://schemas.microsoft.com/office/drawing/2010/main" xmlns:p14="http://schemas.microsoft.com/office/powerpoint/2010/main" xmlns:a16="http://schemas.microsoft.com/office/drawing/2014/main" xmlns="" w="9525">
+                <a14:hiddenLine xmlns="" xmlns:a16="http://schemas.microsoft.com/office/drawing/2014/main" xmlns:p14="http://schemas.microsoft.com/office/powerpoint/2010/main" xmlns:a14="http://schemas.microsoft.com/office/drawing/2010/main" w="9525">
                   <a:solidFill>
                     <a:srgbClr val="000000"/>
                   </a:solidFill>

</xml_diff>